<commit_message>
Adding ohms law slide and cleaning up some others
</commit_message>
<xml_diff>
--- a/SMPS/SMPS 101.pptx
+++ b/SMPS/SMPS 101.pptx
@@ -5,31 +5,32 @@
     <p:sldMasterId id="2147483659" r:id="rId1"/>
   </p:sldMasterIdLst>
   <p:notesMasterIdLst>
-    <p:notesMasterId r:id="rId24"/>
+    <p:notesMasterId r:id="rId25"/>
   </p:notesMasterIdLst>
   <p:sldIdLst>
     <p:sldId id="256" r:id="rId2"/>
     <p:sldId id="257" r:id="rId3"/>
-    <p:sldId id="292" r:id="rId4"/>
-    <p:sldId id="293" r:id="rId5"/>
-    <p:sldId id="294" r:id="rId6"/>
-    <p:sldId id="295" r:id="rId7"/>
-    <p:sldId id="299" r:id="rId8"/>
-    <p:sldId id="300" r:id="rId9"/>
-    <p:sldId id="296" r:id="rId10"/>
-    <p:sldId id="304" r:id="rId11"/>
-    <p:sldId id="303" r:id="rId12"/>
-    <p:sldId id="301" r:id="rId13"/>
-    <p:sldId id="297" r:id="rId14"/>
-    <p:sldId id="302" r:id="rId15"/>
-    <p:sldId id="305" r:id="rId16"/>
-    <p:sldId id="308" r:id="rId17"/>
-    <p:sldId id="298" r:id="rId18"/>
-    <p:sldId id="306" r:id="rId19"/>
-    <p:sldId id="307" r:id="rId20"/>
-    <p:sldId id="309" r:id="rId21"/>
-    <p:sldId id="310" r:id="rId22"/>
-    <p:sldId id="291" r:id="rId23"/>
+    <p:sldId id="311" r:id="rId4"/>
+    <p:sldId id="292" r:id="rId5"/>
+    <p:sldId id="293" r:id="rId6"/>
+    <p:sldId id="294" r:id="rId7"/>
+    <p:sldId id="295" r:id="rId8"/>
+    <p:sldId id="296" r:id="rId9"/>
+    <p:sldId id="304" r:id="rId10"/>
+    <p:sldId id="303" r:id="rId11"/>
+    <p:sldId id="299" r:id="rId12"/>
+    <p:sldId id="300" r:id="rId13"/>
+    <p:sldId id="301" r:id="rId14"/>
+    <p:sldId id="297" r:id="rId15"/>
+    <p:sldId id="302" r:id="rId16"/>
+    <p:sldId id="305" r:id="rId17"/>
+    <p:sldId id="308" r:id="rId18"/>
+    <p:sldId id="298" r:id="rId19"/>
+    <p:sldId id="306" r:id="rId20"/>
+    <p:sldId id="307" r:id="rId21"/>
+    <p:sldId id="309" r:id="rId22"/>
+    <p:sldId id="310" r:id="rId23"/>
+    <p:sldId id="291" r:id="rId24"/>
   </p:sldIdLst>
   <p:sldSz cx="9144000" cy="5143500" type="screen16x9"/>
   <p:notesSz cx="6858000" cy="9144000"/>
@@ -235,6 +236,11 @@
       </a:defRPr>
     </a:lvl9pPr>
   </p:defaultTextStyle>
+  <p:extLst>
+    <p:ext uri="{EFAFB233-063F-42B5-8137-9DF3F51BA10A}">
+      <p15:sldGuideLst xmlns:p15="http://schemas.microsoft.com/office/powerpoint/2012/main"/>
+    </p:ext>
+  </p:extLst>
 </p:presentation>
 </file>
 
@@ -720,7 +726,7 @@
     </p:spTree>
     <p:extLst>
       <p:ext uri="{BB962C8B-B14F-4D97-AF65-F5344CB8AC3E}">
-        <p14:creationId xmlns:p14="http://schemas.microsoft.com/office/powerpoint/2010/main" val="1681352333"/>
+        <p14:creationId xmlns:p14="http://schemas.microsoft.com/office/powerpoint/2010/main" val="3392288824"/>
       </p:ext>
     </p:extLst>
   </p:cSld>
@@ -826,7 +832,7 @@
     </p:spTree>
     <p:extLst>
       <p:ext uri="{BB962C8B-B14F-4D97-AF65-F5344CB8AC3E}">
-        <p14:creationId xmlns:p14="http://schemas.microsoft.com/office/powerpoint/2010/main" val="3392288824"/>
+        <p14:creationId xmlns:p14="http://schemas.microsoft.com/office/powerpoint/2010/main" val="1653682934"/>
       </p:ext>
     </p:extLst>
   </p:cSld>
@@ -932,7 +938,7 @@
     </p:spTree>
     <p:extLst>
       <p:ext uri="{BB962C8B-B14F-4D97-AF65-F5344CB8AC3E}">
-        <p14:creationId xmlns:p14="http://schemas.microsoft.com/office/powerpoint/2010/main" val="4128399948"/>
+        <p14:creationId xmlns:p14="http://schemas.microsoft.com/office/powerpoint/2010/main" val="3812476028"/>
       </p:ext>
     </p:extLst>
   </p:cSld>
@@ -1038,7 +1044,7 @@
     </p:spTree>
     <p:extLst>
       <p:ext uri="{BB962C8B-B14F-4D97-AF65-F5344CB8AC3E}">
-        <p14:creationId xmlns:p14="http://schemas.microsoft.com/office/powerpoint/2010/main" val="233808476"/>
+        <p14:creationId xmlns:p14="http://schemas.microsoft.com/office/powerpoint/2010/main" val="4128399948"/>
       </p:ext>
     </p:extLst>
   </p:cSld>
@@ -1144,7 +1150,7 @@
     </p:spTree>
     <p:extLst>
       <p:ext uri="{BB962C8B-B14F-4D97-AF65-F5344CB8AC3E}">
-        <p14:creationId xmlns:p14="http://schemas.microsoft.com/office/powerpoint/2010/main" val="3487393679"/>
+        <p14:creationId xmlns:p14="http://schemas.microsoft.com/office/powerpoint/2010/main" val="233808476"/>
       </p:ext>
     </p:extLst>
   </p:cSld>
@@ -1250,7 +1256,7 @@
     </p:spTree>
     <p:extLst>
       <p:ext uri="{BB962C8B-B14F-4D97-AF65-F5344CB8AC3E}">
-        <p14:creationId xmlns:p14="http://schemas.microsoft.com/office/powerpoint/2010/main" val="2137278400"/>
+        <p14:creationId xmlns:p14="http://schemas.microsoft.com/office/powerpoint/2010/main" val="3487393679"/>
       </p:ext>
     </p:extLst>
   </p:cSld>
@@ -1356,7 +1362,7 @@
     </p:spTree>
     <p:extLst>
       <p:ext uri="{BB962C8B-B14F-4D97-AF65-F5344CB8AC3E}">
-        <p14:creationId xmlns:p14="http://schemas.microsoft.com/office/powerpoint/2010/main" val="3525806703"/>
+        <p14:creationId xmlns:p14="http://schemas.microsoft.com/office/powerpoint/2010/main" val="2137278400"/>
       </p:ext>
     </p:extLst>
   </p:cSld>
@@ -1462,7 +1468,7 @@
     </p:spTree>
     <p:extLst>
       <p:ext uri="{BB962C8B-B14F-4D97-AF65-F5344CB8AC3E}">
-        <p14:creationId xmlns:p14="http://schemas.microsoft.com/office/powerpoint/2010/main" val="3953592112"/>
+        <p14:creationId xmlns:p14="http://schemas.microsoft.com/office/powerpoint/2010/main" val="3525806703"/>
       </p:ext>
     </p:extLst>
   </p:cSld>
@@ -1568,7 +1574,7 @@
     </p:spTree>
     <p:extLst>
       <p:ext uri="{BB962C8B-B14F-4D97-AF65-F5344CB8AC3E}">
-        <p14:creationId xmlns:p14="http://schemas.microsoft.com/office/powerpoint/2010/main" val="733028523"/>
+        <p14:creationId xmlns:p14="http://schemas.microsoft.com/office/powerpoint/2010/main" val="3953592112"/>
       </p:ext>
     </p:extLst>
   </p:cSld>
@@ -1674,7 +1680,7 @@
     </p:spTree>
     <p:extLst>
       <p:ext uri="{BB962C8B-B14F-4D97-AF65-F5344CB8AC3E}">
-        <p14:creationId xmlns:p14="http://schemas.microsoft.com/office/powerpoint/2010/main" val="2472391708"/>
+        <p14:creationId xmlns:p14="http://schemas.microsoft.com/office/powerpoint/2010/main" val="733028523"/>
       </p:ext>
     </p:extLst>
   </p:cSld>
@@ -1886,7 +1892,7 @@
     </p:spTree>
     <p:extLst>
       <p:ext uri="{BB962C8B-B14F-4D97-AF65-F5344CB8AC3E}">
-        <p14:creationId xmlns:p14="http://schemas.microsoft.com/office/powerpoint/2010/main" val="471277210"/>
+        <p14:creationId xmlns:p14="http://schemas.microsoft.com/office/powerpoint/2010/main" val="2472391708"/>
       </p:ext>
     </p:extLst>
   </p:cSld>
@@ -1992,6 +1998,112 @@
     </p:spTree>
     <p:extLst>
       <p:ext uri="{BB962C8B-B14F-4D97-AF65-F5344CB8AC3E}">
+        <p14:creationId xmlns:p14="http://schemas.microsoft.com/office/powerpoint/2010/main" val="471277210"/>
+      </p:ext>
+    </p:extLst>
+  </p:cSld>
+  <p:clrMapOvr>
+    <a:masterClrMapping/>
+  </p:clrMapOvr>
+</p:notes>
+</file>
+
+<file path=ppt/notesSlides/notesSlide22.xml><?xml version="1.0" encoding="utf-8"?>
+<p:notes xmlns:a="http://schemas.openxmlformats.org/drawingml/2006/main" xmlns:r="http://schemas.openxmlformats.org/officeDocument/2006/relationships" xmlns:p="http://schemas.openxmlformats.org/presentationml/2006/main" showMasterSp="0" showMasterPhAnim="0">
+  <p:cSld>
+    <p:spTree>
+      <p:nvGrpSpPr>
+        <p:cNvPr id="1" name="Shape 57"/>
+        <p:cNvGrpSpPr/>
+        <p:nvPr/>
+      </p:nvGrpSpPr>
+      <p:grpSpPr>
+        <a:xfrm>
+          <a:off x="0" y="0"/>
+          <a:ext cx="0" cy="0"/>
+          <a:chOff x="0" y="0"/>
+          <a:chExt cx="0" cy="0"/>
+        </a:xfrm>
+      </p:grpSpPr>
+      <p:sp>
+        <p:nvSpPr>
+          <p:cNvPr id="58" name="Shape 58"/>
+          <p:cNvSpPr>
+            <a:spLocks noGrp="1" noRot="1" noChangeAspect="1"/>
+          </p:cNvSpPr>
+          <p:nvPr>
+            <p:ph type="sldImg" idx="2"/>
+          </p:nvPr>
+        </p:nvSpPr>
+        <p:spPr>
+          <a:xfrm>
+            <a:off x="381000" y="685800"/>
+            <a:ext cx="6096000" cy="3429000"/>
+          </a:xfrm>
+          <a:custGeom>
+            <a:avLst/>
+            <a:gdLst/>
+            <a:ahLst/>
+            <a:cxnLst/>
+            <a:rect l="0" t="0" r="0" b="0"/>
+            <a:pathLst>
+              <a:path w="120000" h="120000" extrusionOk="0">
+                <a:moveTo>
+                  <a:pt x="0" y="0"/>
+                </a:moveTo>
+                <a:lnTo>
+                  <a:pt x="120000" y="0"/>
+                </a:lnTo>
+                <a:lnTo>
+                  <a:pt x="120000" y="120000"/>
+                </a:lnTo>
+                <a:lnTo>
+                  <a:pt x="0" y="120000"/>
+                </a:lnTo>
+                <a:close/>
+              </a:path>
+            </a:pathLst>
+          </a:custGeom>
+        </p:spPr>
+      </p:sp>
+      <p:sp>
+        <p:nvSpPr>
+          <p:cNvPr id="59" name="Shape 59"/>
+          <p:cNvSpPr txBox="1">
+            <a:spLocks noGrp="1"/>
+          </p:cNvSpPr>
+          <p:nvPr>
+            <p:ph type="body" idx="1"/>
+          </p:nvPr>
+        </p:nvSpPr>
+        <p:spPr>
+          <a:xfrm>
+            <a:off x="685800" y="4343400"/>
+            <a:ext cx="5486400" cy="4114800"/>
+          </a:xfrm>
+          <a:prstGeom prst="rect">
+            <a:avLst/>
+          </a:prstGeom>
+        </p:spPr>
+        <p:txBody>
+          <a:bodyPr wrap="square" lIns="91425" tIns="91425" rIns="91425" bIns="91425" anchor="t" anchorCtr="0">
+            <a:noAutofit/>
+          </a:bodyPr>
+          <a:lstStyle/>
+          <a:p>
+            <a:pPr lvl="0" rtl="0">
+              <a:spcBef>
+                <a:spcPts val="0"/>
+              </a:spcBef>
+              <a:buNone/>
+            </a:pPr>
+            <a:endParaRPr/>
+          </a:p>
+        </p:txBody>
+      </p:sp>
+    </p:spTree>
+    <p:extLst>
+      <p:ext uri="{BB962C8B-B14F-4D97-AF65-F5344CB8AC3E}">
         <p14:creationId xmlns:p14="http://schemas.microsoft.com/office/powerpoint/2010/main" val="3450128496"/>
       </p:ext>
     </p:extLst>
@@ -2002,7 +2114,7 @@
 </p:notes>
 </file>
 
-<file path=ppt/notesSlides/notesSlide22.xml><?xml version="1.0" encoding="utf-8"?>
+<file path=ppt/notesSlides/notesSlide23.xml><?xml version="1.0" encoding="utf-8"?>
 <p:notes xmlns:a="http://schemas.openxmlformats.org/drawingml/2006/main" xmlns:r="http://schemas.openxmlformats.org/officeDocument/2006/relationships" xmlns:p="http://schemas.openxmlformats.org/presentationml/2006/main" showMasterSp="0" showMasterPhAnim="0">
   <p:cSld>
     <p:spTree>
@@ -2204,7 +2316,7 @@
     </p:spTree>
     <p:extLst>
       <p:ext uri="{BB962C8B-B14F-4D97-AF65-F5344CB8AC3E}">
-        <p14:creationId xmlns:p14="http://schemas.microsoft.com/office/powerpoint/2010/main" val="556561427"/>
+        <p14:creationId xmlns:p14="http://schemas.microsoft.com/office/powerpoint/2010/main" val="2900970681"/>
       </p:ext>
     </p:extLst>
   </p:cSld>
@@ -2310,7 +2422,7 @@
     </p:spTree>
     <p:extLst>
       <p:ext uri="{BB962C8B-B14F-4D97-AF65-F5344CB8AC3E}">
-        <p14:creationId xmlns:p14="http://schemas.microsoft.com/office/powerpoint/2010/main" val="664910151"/>
+        <p14:creationId xmlns:p14="http://schemas.microsoft.com/office/powerpoint/2010/main" val="556561427"/>
       </p:ext>
     </p:extLst>
   </p:cSld>
@@ -2416,7 +2528,7 @@
     </p:spTree>
     <p:extLst>
       <p:ext uri="{BB962C8B-B14F-4D97-AF65-F5344CB8AC3E}">
-        <p14:creationId xmlns:p14="http://schemas.microsoft.com/office/powerpoint/2010/main" val="3153160969"/>
+        <p14:creationId xmlns:p14="http://schemas.microsoft.com/office/powerpoint/2010/main" val="664910151"/>
       </p:ext>
     </p:extLst>
   </p:cSld>
@@ -2522,7 +2634,7 @@
     </p:spTree>
     <p:extLst>
       <p:ext uri="{BB962C8B-B14F-4D97-AF65-F5344CB8AC3E}">
-        <p14:creationId xmlns:p14="http://schemas.microsoft.com/office/powerpoint/2010/main" val="3940584994"/>
+        <p14:creationId xmlns:p14="http://schemas.microsoft.com/office/powerpoint/2010/main" val="3153160969"/>
       </p:ext>
     </p:extLst>
   </p:cSld>
@@ -2628,7 +2740,7 @@
     </p:spTree>
     <p:extLst>
       <p:ext uri="{BB962C8B-B14F-4D97-AF65-F5344CB8AC3E}">
-        <p14:creationId xmlns:p14="http://schemas.microsoft.com/office/powerpoint/2010/main" val="1653682934"/>
+        <p14:creationId xmlns:p14="http://schemas.microsoft.com/office/powerpoint/2010/main" val="3940584994"/>
       </p:ext>
     </p:extLst>
   </p:cSld>
@@ -2734,7 +2846,7 @@
     </p:spTree>
     <p:extLst>
       <p:ext uri="{BB962C8B-B14F-4D97-AF65-F5344CB8AC3E}">
-        <p14:creationId xmlns:p14="http://schemas.microsoft.com/office/powerpoint/2010/main" val="3812476028"/>
+        <p14:creationId xmlns:p14="http://schemas.microsoft.com/office/powerpoint/2010/main" val="3061874318"/>
       </p:ext>
     </p:extLst>
   </p:cSld>
@@ -2840,7 +2952,7 @@
     </p:spTree>
     <p:extLst>
       <p:ext uri="{BB962C8B-B14F-4D97-AF65-F5344CB8AC3E}">
-        <p14:creationId xmlns:p14="http://schemas.microsoft.com/office/powerpoint/2010/main" val="3061874318"/>
+        <p14:creationId xmlns:p14="http://schemas.microsoft.com/office/powerpoint/2010/main" val="1681352333"/>
       </p:ext>
     </p:extLst>
   </p:cSld>
@@ -6671,395 +6783,6 @@
         </p:nvSpPr>
         <p:spPr>
           <a:xfrm>
-            <a:off x="311700" y="1108516"/>
-            <a:ext cx="3693858" cy="2492347"/>
-          </a:xfrm>
-          <a:prstGeom prst="rect">
-            <a:avLst/>
-          </a:prstGeom>
-        </p:spPr>
-        <p:txBody>
-          <a:bodyPr wrap="square" lIns="91425" tIns="91425" rIns="91425" bIns="91425" anchor="t" anchorCtr="0">
-            <a:noAutofit/>
-          </a:bodyPr>
-          <a:lstStyle/>
-          <a:p>
-            <a:pPr lvl="0">
-              <a:spcBef>
-                <a:spcPts val="0"/>
-              </a:spcBef>
-              <a:buClr>
-                <a:schemeClr val="dk1"/>
-              </a:buClr>
-              <a:buSzPts val="1100"/>
-              <a:buFont typeface="Arial"/>
-              <a:buNone/>
-            </a:pPr>
-            <a:r>
-              <a:rPr lang="en-US" dirty="0" smtClean="0">
-                <a:latin typeface="Calibri"/>
-                <a:ea typeface="Calibri"/>
-                <a:cs typeface="Calibri"/>
-                <a:sym typeface="Calibri"/>
-              </a:rPr>
-              <a:t>Capacitor</a:t>
-            </a:r>
-          </a:p>
-          <a:p>
-            <a:pPr lvl="0">
-              <a:spcBef>
-                <a:spcPts val="0"/>
-              </a:spcBef>
-              <a:buClr>
-                <a:schemeClr val="dk1"/>
-              </a:buClr>
-              <a:buSzPts val="1100"/>
-              <a:buFont typeface="Arial"/>
-              <a:buNone/>
-            </a:pPr>
-            <a:r>
-              <a:rPr lang="en-US" dirty="0" smtClean="0">
-                <a:latin typeface="Calibri"/>
-                <a:ea typeface="Calibri"/>
-                <a:cs typeface="Calibri"/>
-                <a:sym typeface="Calibri"/>
-              </a:rPr>
-              <a:t>Stores charge in parallel plates </a:t>
-            </a:r>
-            <a:r>
-              <a:rPr lang="en-US" dirty="0" smtClean="0">
-                <a:latin typeface="Calibri"/>
-                <a:ea typeface="Calibri"/>
-                <a:cs typeface="Calibri"/>
-                <a:sym typeface="Calibri"/>
-              </a:rPr>
-              <a:t>Resists changes in voltage</a:t>
-            </a:r>
-          </a:p>
-          <a:p>
-            <a:pPr lvl="0">
-              <a:spcBef>
-                <a:spcPts val="0"/>
-              </a:spcBef>
-              <a:buClr>
-                <a:schemeClr val="dk1"/>
-              </a:buClr>
-              <a:buSzPts val="1100"/>
-              <a:buFont typeface="Arial"/>
-              <a:buNone/>
-            </a:pPr>
-            <a:r>
-              <a:rPr lang="en-US" dirty="0" smtClean="0">
-                <a:latin typeface="Calibri"/>
-                <a:ea typeface="Calibri"/>
-                <a:cs typeface="Calibri"/>
-                <a:sym typeface="Calibri"/>
-              </a:rPr>
-              <a:t>Measured in Farads – 1 Farad = 1 coulomb at 1 volt</a:t>
-            </a:r>
-            <a:endParaRPr lang="en" dirty="0" smtClean="0">
-              <a:latin typeface="Calibri"/>
-              <a:ea typeface="Calibri"/>
-              <a:cs typeface="Calibri"/>
-              <a:sym typeface="Calibri"/>
-            </a:endParaRPr>
-          </a:p>
-          <a:p>
-            <a:pPr lvl="0">
-              <a:spcBef>
-                <a:spcPts val="0"/>
-              </a:spcBef>
-              <a:buClr>
-                <a:schemeClr val="dk1"/>
-              </a:buClr>
-              <a:buSzPts val="1100"/>
-              <a:buFont typeface="Arial"/>
-              <a:buNone/>
-            </a:pPr>
-            <a:endParaRPr lang="en" dirty="0">
-              <a:latin typeface="Calibri"/>
-              <a:ea typeface="Calibri"/>
-              <a:cs typeface="Calibri"/>
-              <a:sym typeface="Calibri"/>
-            </a:endParaRPr>
-          </a:p>
-        </p:txBody>
-      </p:sp>
-      <p:pic>
-        <p:nvPicPr>
-          <p:cNvPr id="64" name="Shape 64" descr="hamster-university-01.png"/>
-          <p:cNvPicPr preferRelativeResize="0"/>
-          <p:nvPr/>
-        </p:nvPicPr>
-        <p:blipFill>
-          <a:blip r:embed="rId3">
-            <a:alphaModFix/>
-          </a:blip>
-          <a:stretch>
-            <a:fillRect/>
-          </a:stretch>
-        </p:blipFill>
-        <p:spPr>
-          <a:xfrm>
-            <a:off x="8308575" y="4313200"/>
-            <a:ext cx="835425" cy="830300"/>
-          </a:xfrm>
-          <a:prstGeom prst="rect">
-            <a:avLst/>
-          </a:prstGeom>
-          <a:noFill/>
-          <a:ln>
-            <a:noFill/>
-          </a:ln>
-        </p:spPr>
-      </p:pic>
-      <p:pic>
-        <p:nvPicPr>
-          <p:cNvPr id="65" name="Shape 65" descr="DC801-Minibadge-Front-Basic.png"/>
-          <p:cNvPicPr preferRelativeResize="0"/>
-          <p:nvPr/>
-        </p:nvPicPr>
-        <p:blipFill>
-          <a:blip r:embed="rId4">
-            <a:alphaModFix/>
-          </a:blip>
-          <a:stretch>
-            <a:fillRect/>
-          </a:stretch>
-        </p:blipFill>
-        <p:spPr>
-          <a:xfrm>
-            <a:off x="0" y="4345550"/>
-            <a:ext cx="789065" cy="765576"/>
-          </a:xfrm>
-          <a:prstGeom prst="rect">
-            <a:avLst/>
-          </a:prstGeom>
-          <a:noFill/>
-          <a:ln>
-            <a:noFill/>
-          </a:ln>
-        </p:spPr>
-      </p:pic>
-      <p:sp>
-        <p:nvSpPr>
-          <p:cNvPr id="66" name="Shape 66"/>
-          <p:cNvSpPr txBox="1"/>
-          <p:nvPr/>
-        </p:nvSpPr>
-        <p:spPr>
-          <a:xfrm>
-            <a:off x="6944025" y="4735825"/>
-            <a:ext cx="1560600" cy="320400"/>
-          </a:xfrm>
-          <a:prstGeom prst="rect">
-            <a:avLst/>
-          </a:prstGeom>
-          <a:noFill/>
-          <a:ln>
-            <a:noFill/>
-          </a:ln>
-        </p:spPr>
-        <p:txBody>
-          <a:bodyPr wrap="square" lIns="91425" tIns="91425" rIns="91425" bIns="91425" anchor="t" anchorCtr="0">
-            <a:noAutofit/>
-          </a:bodyPr>
-          <a:lstStyle/>
-          <a:p>
-            <a:pPr lvl="0" rtl="0">
-              <a:spcBef>
-                <a:spcPts val="0"/>
-              </a:spcBef>
-              <a:buNone/>
-            </a:pPr>
-            <a:r>
-              <a:rPr lang="en" sz="1800" dirty="0" smtClean="0">
-                <a:latin typeface="Calibri"/>
-                <a:ea typeface="Calibri"/>
-                <a:cs typeface="Calibri"/>
-                <a:sym typeface="Calibri"/>
-              </a:rPr>
-              <a:t>SMPS 101</a:t>
-            </a:r>
-            <a:endParaRPr lang="en" sz="1800" dirty="0">
-              <a:latin typeface="Calibri"/>
-              <a:ea typeface="Calibri"/>
-              <a:cs typeface="Calibri"/>
-              <a:sym typeface="Calibri"/>
-            </a:endParaRPr>
-          </a:p>
-        </p:txBody>
-      </p:sp>
-      <p:pic>
-        <p:nvPicPr>
-          <p:cNvPr id="2" name="Picture 1"/>
-          <p:cNvPicPr>
-            <a:picLocks noChangeAspect="1"/>
-          </p:cNvPicPr>
-          <p:nvPr/>
-        </p:nvPicPr>
-        <p:blipFill>
-          <a:blip r:embed="rId5">
-            <a:extLst>
-              <a:ext uri="{28A0092B-C50C-407E-A947-70E740481C1C}">
-                <a14:useLocalDpi xmlns:a14="http://schemas.microsoft.com/office/drawing/2010/main" val="0"/>
-              </a:ext>
-            </a:extLst>
-          </a:blip>
-          <a:stretch>
-            <a:fillRect/>
-          </a:stretch>
-        </p:blipFill>
-        <p:spPr>
-          <a:xfrm>
-            <a:off x="4202800" y="954705"/>
-            <a:ext cx="4479954" cy="2799971"/>
-          </a:xfrm>
-          <a:prstGeom prst="rect">
-            <a:avLst/>
-          </a:prstGeom>
-        </p:spPr>
-      </p:pic>
-    </p:spTree>
-    <p:extLst>
-      <p:ext uri="{BB962C8B-B14F-4D97-AF65-F5344CB8AC3E}">
-        <p14:creationId xmlns:p14="http://schemas.microsoft.com/office/powerpoint/2010/main" val="1345142895"/>
-      </p:ext>
-    </p:extLst>
-  </p:cSld>
-  <p:clrMapOvr>
-    <a:masterClrMapping/>
-  </p:clrMapOvr>
-  <p:timing>
-    <p:tnLst>
-      <p:par>
-        <p:cTn id="1" dur="indefinite" restart="never" nodeType="tmRoot"/>
-      </p:par>
-    </p:tnLst>
-  </p:timing>
-</p:sld>
-</file>
-
-<file path=ppt/slides/slide11.xml><?xml version="1.0" encoding="utf-8"?>
-<p:sld xmlns:a="http://schemas.openxmlformats.org/drawingml/2006/main" xmlns:r="http://schemas.openxmlformats.org/officeDocument/2006/relationships" xmlns:p="http://schemas.openxmlformats.org/presentationml/2006/main">
-  <p:cSld>
-    <p:spTree>
-      <p:nvGrpSpPr>
-        <p:cNvPr id="1" name="Shape 60"/>
-        <p:cNvGrpSpPr/>
-        <p:nvPr/>
-      </p:nvGrpSpPr>
-      <p:grpSpPr>
-        <a:xfrm>
-          <a:off x="0" y="0"/>
-          <a:ext cx="0" cy="0"/>
-          <a:chOff x="0" y="0"/>
-          <a:chExt cx="0" cy="0"/>
-        </a:xfrm>
-      </p:grpSpPr>
-      <p:sp>
-        <p:nvSpPr>
-          <p:cNvPr id="61" name="Shape 61"/>
-          <p:cNvSpPr txBox="1"/>
-          <p:nvPr/>
-        </p:nvSpPr>
-        <p:spPr>
-          <a:xfrm>
-            <a:off x="0" y="4313150"/>
-            <a:ext cx="9144000" cy="830400"/>
-          </a:xfrm>
-          <a:prstGeom prst="rect">
-            <a:avLst/>
-          </a:prstGeom>
-          <a:solidFill>
-            <a:srgbClr val="999999"/>
-          </a:solidFill>
-          <a:ln>
-            <a:noFill/>
-          </a:ln>
-        </p:spPr>
-        <p:txBody>
-          <a:bodyPr wrap="square" lIns="91425" tIns="91425" rIns="91425" bIns="91425" anchor="t" anchorCtr="0">
-            <a:noAutofit/>
-          </a:bodyPr>
-          <a:lstStyle/>
-          <a:p>
-            <a:pPr lvl="0" rtl="0">
-              <a:spcBef>
-                <a:spcPts val="0"/>
-              </a:spcBef>
-              <a:buNone/>
-            </a:pPr>
-            <a:endParaRPr/>
-          </a:p>
-        </p:txBody>
-      </p:sp>
-      <p:sp>
-        <p:nvSpPr>
-          <p:cNvPr id="62" name="Shape 62"/>
-          <p:cNvSpPr txBox="1">
-            <a:spLocks noGrp="1"/>
-          </p:cNvSpPr>
-          <p:nvPr>
-            <p:ph type="title"/>
-          </p:nvPr>
-        </p:nvSpPr>
-        <p:spPr>
-          <a:xfrm>
-            <a:off x="311700" y="131475"/>
-            <a:ext cx="8520600" cy="546000"/>
-          </a:xfrm>
-          <a:prstGeom prst="rect">
-            <a:avLst/>
-          </a:prstGeom>
-        </p:spPr>
-        <p:txBody>
-          <a:bodyPr wrap="square" lIns="91425" tIns="91425" rIns="91425" bIns="91425" anchor="t" anchorCtr="0">
-            <a:noAutofit/>
-          </a:bodyPr>
-          <a:lstStyle/>
-          <a:p>
-            <a:pPr lvl="0" rtl="0">
-              <a:spcBef>
-                <a:spcPts val="0"/>
-              </a:spcBef>
-              <a:buClr>
-                <a:schemeClr val="dk1"/>
-              </a:buClr>
-              <a:buSzPts val="1100"/>
-              <a:buFont typeface="Arial"/>
-              <a:buNone/>
-            </a:pPr>
-            <a:r>
-              <a:rPr lang="en" dirty="0" smtClean="0">
-                <a:latin typeface="Calibri"/>
-                <a:ea typeface="Calibri"/>
-                <a:cs typeface="Calibri"/>
-                <a:sym typeface="Calibri"/>
-              </a:rPr>
-              <a:t>An aside – Capacitors vs Inductors</a:t>
-            </a:r>
-            <a:endParaRPr lang="en" dirty="0">
-              <a:latin typeface="Calibri"/>
-              <a:ea typeface="Calibri"/>
-              <a:cs typeface="Calibri"/>
-              <a:sym typeface="Calibri"/>
-            </a:endParaRPr>
-          </a:p>
-        </p:txBody>
-      </p:sp>
-      <p:sp>
-        <p:nvSpPr>
-          <p:cNvPr id="63" name="Shape 63"/>
-          <p:cNvSpPr txBox="1">
-            <a:spLocks noGrp="1"/>
-          </p:cNvSpPr>
-          <p:nvPr>
-            <p:ph type="body" idx="1"/>
-          </p:nvPr>
-        </p:nvSpPr>
-        <p:spPr>
-          <a:xfrm>
             <a:off x="311700" y="712021"/>
             <a:ext cx="4147012" cy="3293349"/>
           </a:xfrm>
@@ -7387,7 +7110,587 @@
 </p:sld>
 </file>
 
+<file path=ppt/slides/slide11.xml><?xml version="1.0" encoding="utf-8"?>
+<p:sld xmlns:a="http://schemas.openxmlformats.org/drawingml/2006/main" xmlns:r="http://schemas.openxmlformats.org/officeDocument/2006/relationships" xmlns:p="http://schemas.openxmlformats.org/presentationml/2006/main">
+  <p:cSld>
+    <p:spTree>
+      <p:nvGrpSpPr>
+        <p:cNvPr id="1" name="Shape 60"/>
+        <p:cNvGrpSpPr/>
+        <p:nvPr/>
+      </p:nvGrpSpPr>
+      <p:grpSpPr>
+        <a:xfrm>
+          <a:off x="0" y="0"/>
+          <a:ext cx="0" cy="0"/>
+          <a:chOff x="0" y="0"/>
+          <a:chExt cx="0" cy="0"/>
+        </a:xfrm>
+      </p:grpSpPr>
+      <p:sp>
+        <p:nvSpPr>
+          <p:cNvPr id="61" name="Shape 61"/>
+          <p:cNvSpPr txBox="1"/>
+          <p:nvPr/>
+        </p:nvSpPr>
+        <p:spPr>
+          <a:xfrm>
+            <a:off x="0" y="4313150"/>
+            <a:ext cx="9144000" cy="830400"/>
+          </a:xfrm>
+          <a:prstGeom prst="rect">
+            <a:avLst/>
+          </a:prstGeom>
+          <a:solidFill>
+            <a:srgbClr val="999999"/>
+          </a:solidFill>
+          <a:ln>
+            <a:noFill/>
+          </a:ln>
+        </p:spPr>
+        <p:txBody>
+          <a:bodyPr wrap="square" lIns="91425" tIns="91425" rIns="91425" bIns="91425" anchor="t" anchorCtr="0">
+            <a:noAutofit/>
+          </a:bodyPr>
+          <a:lstStyle/>
+          <a:p>
+            <a:pPr lvl="0" rtl="0">
+              <a:spcBef>
+                <a:spcPts val="0"/>
+              </a:spcBef>
+              <a:buNone/>
+            </a:pPr>
+            <a:endParaRPr/>
+          </a:p>
+        </p:txBody>
+      </p:sp>
+      <p:sp>
+        <p:nvSpPr>
+          <p:cNvPr id="62" name="Shape 62"/>
+          <p:cNvSpPr txBox="1">
+            <a:spLocks noGrp="1"/>
+          </p:cNvSpPr>
+          <p:nvPr>
+            <p:ph type="title"/>
+          </p:nvPr>
+        </p:nvSpPr>
+        <p:spPr>
+          <a:xfrm>
+            <a:off x="311700" y="131475"/>
+            <a:ext cx="8520600" cy="546000"/>
+          </a:xfrm>
+          <a:prstGeom prst="rect">
+            <a:avLst/>
+          </a:prstGeom>
+        </p:spPr>
+        <p:txBody>
+          <a:bodyPr wrap="square" lIns="91425" tIns="91425" rIns="91425" bIns="91425" anchor="t" anchorCtr="0">
+            <a:noAutofit/>
+          </a:bodyPr>
+          <a:lstStyle/>
+          <a:p>
+            <a:pPr lvl="0" rtl="0">
+              <a:spcBef>
+                <a:spcPts val="0"/>
+              </a:spcBef>
+              <a:buClr>
+                <a:schemeClr val="dk1"/>
+              </a:buClr>
+              <a:buSzPts val="1100"/>
+              <a:buFont typeface="Arial"/>
+              <a:buNone/>
+            </a:pPr>
+            <a:r>
+              <a:rPr lang="en" dirty="0" smtClean="0">
+                <a:latin typeface="Calibri"/>
+                <a:ea typeface="Calibri"/>
+                <a:cs typeface="Calibri"/>
+                <a:sym typeface="Calibri"/>
+              </a:rPr>
+              <a:t>Topologies</a:t>
+            </a:r>
+            <a:endParaRPr lang="en" dirty="0">
+              <a:latin typeface="Calibri"/>
+              <a:ea typeface="Calibri"/>
+              <a:cs typeface="Calibri"/>
+              <a:sym typeface="Calibri"/>
+            </a:endParaRPr>
+          </a:p>
+        </p:txBody>
+      </p:sp>
+      <p:pic>
+        <p:nvPicPr>
+          <p:cNvPr id="64" name="Shape 64" descr="hamster-university-01.png"/>
+          <p:cNvPicPr preferRelativeResize="0"/>
+          <p:nvPr/>
+        </p:nvPicPr>
+        <p:blipFill>
+          <a:blip r:embed="rId3">
+            <a:alphaModFix/>
+          </a:blip>
+          <a:stretch>
+            <a:fillRect/>
+          </a:stretch>
+        </p:blipFill>
+        <p:spPr>
+          <a:xfrm>
+            <a:off x="8308575" y="4313200"/>
+            <a:ext cx="835425" cy="830300"/>
+          </a:xfrm>
+          <a:prstGeom prst="rect">
+            <a:avLst/>
+          </a:prstGeom>
+          <a:noFill/>
+          <a:ln>
+            <a:noFill/>
+          </a:ln>
+        </p:spPr>
+      </p:pic>
+      <p:pic>
+        <p:nvPicPr>
+          <p:cNvPr id="65" name="Shape 65" descr="DC801-Minibadge-Front-Basic.png"/>
+          <p:cNvPicPr preferRelativeResize="0"/>
+          <p:nvPr/>
+        </p:nvPicPr>
+        <p:blipFill>
+          <a:blip r:embed="rId4">
+            <a:alphaModFix/>
+          </a:blip>
+          <a:stretch>
+            <a:fillRect/>
+          </a:stretch>
+        </p:blipFill>
+        <p:spPr>
+          <a:xfrm>
+            <a:off x="0" y="4345550"/>
+            <a:ext cx="789065" cy="765576"/>
+          </a:xfrm>
+          <a:prstGeom prst="rect">
+            <a:avLst/>
+          </a:prstGeom>
+          <a:noFill/>
+          <a:ln>
+            <a:noFill/>
+          </a:ln>
+        </p:spPr>
+      </p:pic>
+      <p:sp>
+        <p:nvSpPr>
+          <p:cNvPr id="66" name="Shape 66"/>
+          <p:cNvSpPr txBox="1"/>
+          <p:nvPr/>
+        </p:nvSpPr>
+        <p:spPr>
+          <a:xfrm>
+            <a:off x="6944025" y="4735825"/>
+            <a:ext cx="1560600" cy="320400"/>
+          </a:xfrm>
+          <a:prstGeom prst="rect">
+            <a:avLst/>
+          </a:prstGeom>
+          <a:noFill/>
+          <a:ln>
+            <a:noFill/>
+          </a:ln>
+        </p:spPr>
+        <p:txBody>
+          <a:bodyPr wrap="square" lIns="91425" tIns="91425" rIns="91425" bIns="91425" anchor="t" anchorCtr="0">
+            <a:noAutofit/>
+          </a:bodyPr>
+          <a:lstStyle/>
+          <a:p>
+            <a:pPr lvl="0" rtl="0">
+              <a:spcBef>
+                <a:spcPts val="0"/>
+              </a:spcBef>
+              <a:buNone/>
+            </a:pPr>
+            <a:r>
+              <a:rPr lang="en" sz="1800" dirty="0" smtClean="0">
+                <a:latin typeface="Calibri"/>
+                <a:ea typeface="Calibri"/>
+                <a:cs typeface="Calibri"/>
+                <a:sym typeface="Calibri"/>
+              </a:rPr>
+              <a:t>SMPS 101</a:t>
+            </a:r>
+            <a:endParaRPr lang="en" sz="1800" dirty="0">
+              <a:latin typeface="Calibri"/>
+              <a:ea typeface="Calibri"/>
+              <a:cs typeface="Calibri"/>
+              <a:sym typeface="Calibri"/>
+            </a:endParaRPr>
+          </a:p>
+        </p:txBody>
+      </p:sp>
+      <p:pic>
+        <p:nvPicPr>
+          <p:cNvPr id="5" name="Picture 4"/>
+          <p:cNvPicPr>
+            <a:picLocks noChangeAspect="1"/>
+          </p:cNvPicPr>
+          <p:nvPr/>
+        </p:nvPicPr>
+        <p:blipFill>
+          <a:blip r:embed="rId5">
+            <a:extLst>
+              <a:ext uri="{28A0092B-C50C-407E-A947-70E740481C1C}">
+                <a14:useLocalDpi xmlns:a14="http://schemas.microsoft.com/office/drawing/2010/main" val="0"/>
+              </a:ext>
+            </a:extLst>
+          </a:blip>
+          <a:stretch>
+            <a:fillRect/>
+          </a:stretch>
+        </p:blipFill>
+        <p:spPr>
+          <a:xfrm>
+            <a:off x="2337500" y="34083"/>
+            <a:ext cx="4422640" cy="4922459"/>
+          </a:xfrm>
+          <a:prstGeom prst="rect">
+            <a:avLst/>
+          </a:prstGeom>
+        </p:spPr>
+      </p:pic>
+    </p:spTree>
+    <p:extLst>
+      <p:ext uri="{BB962C8B-B14F-4D97-AF65-F5344CB8AC3E}">
+        <p14:creationId xmlns:p14="http://schemas.microsoft.com/office/powerpoint/2010/main" val="1814069948"/>
+      </p:ext>
+    </p:extLst>
+  </p:cSld>
+  <p:clrMapOvr>
+    <a:masterClrMapping/>
+  </p:clrMapOvr>
+  <p:timing>
+    <p:tnLst>
+      <p:par>
+        <p:cTn id="1" dur="indefinite" restart="never" nodeType="tmRoot"/>
+      </p:par>
+    </p:tnLst>
+  </p:timing>
+</p:sld>
+</file>
+
 <file path=ppt/slides/slide12.xml><?xml version="1.0" encoding="utf-8"?>
+<p:sld xmlns:a="http://schemas.openxmlformats.org/drawingml/2006/main" xmlns:r="http://schemas.openxmlformats.org/officeDocument/2006/relationships" xmlns:p="http://schemas.openxmlformats.org/presentationml/2006/main">
+  <p:cSld>
+    <p:spTree>
+      <p:nvGrpSpPr>
+        <p:cNvPr id="1" name="Shape 60"/>
+        <p:cNvGrpSpPr/>
+        <p:nvPr/>
+      </p:nvGrpSpPr>
+      <p:grpSpPr>
+        <a:xfrm>
+          <a:off x="0" y="0"/>
+          <a:ext cx="0" cy="0"/>
+          <a:chOff x="0" y="0"/>
+          <a:chExt cx="0" cy="0"/>
+        </a:xfrm>
+      </p:grpSpPr>
+      <p:sp>
+        <p:nvSpPr>
+          <p:cNvPr id="61" name="Shape 61"/>
+          <p:cNvSpPr txBox="1"/>
+          <p:nvPr/>
+        </p:nvSpPr>
+        <p:spPr>
+          <a:xfrm>
+            <a:off x="0" y="4313150"/>
+            <a:ext cx="9144000" cy="830400"/>
+          </a:xfrm>
+          <a:prstGeom prst="rect">
+            <a:avLst/>
+          </a:prstGeom>
+          <a:solidFill>
+            <a:srgbClr val="999999"/>
+          </a:solidFill>
+          <a:ln>
+            <a:noFill/>
+          </a:ln>
+        </p:spPr>
+        <p:txBody>
+          <a:bodyPr wrap="square" lIns="91425" tIns="91425" rIns="91425" bIns="91425" anchor="t" anchorCtr="0">
+            <a:noAutofit/>
+          </a:bodyPr>
+          <a:lstStyle/>
+          <a:p>
+            <a:pPr lvl="0" rtl="0">
+              <a:spcBef>
+                <a:spcPts val="0"/>
+              </a:spcBef>
+              <a:buNone/>
+            </a:pPr>
+            <a:endParaRPr/>
+          </a:p>
+        </p:txBody>
+      </p:sp>
+      <p:sp>
+        <p:nvSpPr>
+          <p:cNvPr id="62" name="Shape 62"/>
+          <p:cNvSpPr txBox="1">
+            <a:spLocks noGrp="1"/>
+          </p:cNvSpPr>
+          <p:nvPr>
+            <p:ph type="title"/>
+          </p:nvPr>
+        </p:nvSpPr>
+        <p:spPr>
+          <a:xfrm>
+            <a:off x="311700" y="131475"/>
+            <a:ext cx="8520600" cy="546000"/>
+          </a:xfrm>
+          <a:prstGeom prst="rect">
+            <a:avLst/>
+          </a:prstGeom>
+        </p:spPr>
+        <p:txBody>
+          <a:bodyPr wrap="square" lIns="91425" tIns="91425" rIns="91425" bIns="91425" anchor="t" anchorCtr="0">
+            <a:noAutofit/>
+          </a:bodyPr>
+          <a:lstStyle/>
+          <a:p>
+            <a:pPr lvl="0" rtl="0">
+              <a:spcBef>
+                <a:spcPts val="0"/>
+              </a:spcBef>
+              <a:buClr>
+                <a:schemeClr val="dk1"/>
+              </a:buClr>
+              <a:buSzPts val="1100"/>
+              <a:buFont typeface="Arial"/>
+              <a:buNone/>
+            </a:pPr>
+            <a:r>
+              <a:rPr lang="en" dirty="0" smtClean="0">
+                <a:latin typeface="Calibri"/>
+                <a:ea typeface="Calibri"/>
+                <a:cs typeface="Calibri"/>
+                <a:sym typeface="Calibri"/>
+              </a:rPr>
+              <a:t>Topologies</a:t>
+            </a:r>
+            <a:endParaRPr lang="en" dirty="0">
+              <a:latin typeface="Calibri"/>
+              <a:ea typeface="Calibri"/>
+              <a:cs typeface="Calibri"/>
+              <a:sym typeface="Calibri"/>
+            </a:endParaRPr>
+          </a:p>
+        </p:txBody>
+      </p:sp>
+      <p:sp>
+        <p:nvSpPr>
+          <p:cNvPr id="63" name="Shape 63"/>
+          <p:cNvSpPr txBox="1">
+            <a:spLocks noGrp="1"/>
+          </p:cNvSpPr>
+          <p:nvPr>
+            <p:ph type="body" idx="1"/>
+          </p:nvPr>
+        </p:nvSpPr>
+        <p:spPr>
+          <a:xfrm>
+            <a:off x="7098972" y="3584455"/>
+            <a:ext cx="1209603" cy="517358"/>
+          </a:xfrm>
+          <a:prstGeom prst="rect">
+            <a:avLst/>
+          </a:prstGeom>
+        </p:spPr>
+        <p:txBody>
+          <a:bodyPr wrap="square" lIns="91425" tIns="91425" rIns="91425" bIns="91425" anchor="t" anchorCtr="0">
+            <a:noAutofit/>
+          </a:bodyPr>
+          <a:lstStyle/>
+          <a:p>
+            <a:pPr lvl="0">
+              <a:spcBef>
+                <a:spcPts val="0"/>
+              </a:spcBef>
+              <a:buClr>
+                <a:schemeClr val="dk1"/>
+              </a:buClr>
+              <a:buSzPts val="1100"/>
+              <a:buFont typeface="Arial"/>
+              <a:buNone/>
+            </a:pPr>
+            <a:r>
+              <a:rPr lang="en" dirty="0" smtClean="0">
+                <a:latin typeface="Calibri"/>
+                <a:ea typeface="Calibri"/>
+                <a:cs typeface="Calibri"/>
+                <a:sym typeface="Calibri"/>
+              </a:rPr>
+              <a:t>… what?</a:t>
+            </a:r>
+            <a:endParaRPr lang="en" dirty="0">
+              <a:latin typeface="Calibri"/>
+              <a:ea typeface="Calibri"/>
+              <a:cs typeface="Calibri"/>
+              <a:sym typeface="Calibri"/>
+            </a:endParaRPr>
+          </a:p>
+        </p:txBody>
+      </p:sp>
+      <p:pic>
+        <p:nvPicPr>
+          <p:cNvPr id="64" name="Shape 64" descr="hamster-university-01.png"/>
+          <p:cNvPicPr preferRelativeResize="0"/>
+          <p:nvPr/>
+        </p:nvPicPr>
+        <p:blipFill>
+          <a:blip r:embed="rId3">
+            <a:alphaModFix/>
+          </a:blip>
+          <a:stretch>
+            <a:fillRect/>
+          </a:stretch>
+        </p:blipFill>
+        <p:spPr>
+          <a:xfrm>
+            <a:off x="8308575" y="4313200"/>
+            <a:ext cx="835425" cy="830300"/>
+          </a:xfrm>
+          <a:prstGeom prst="rect">
+            <a:avLst/>
+          </a:prstGeom>
+          <a:noFill/>
+          <a:ln>
+            <a:noFill/>
+          </a:ln>
+        </p:spPr>
+      </p:pic>
+      <p:pic>
+        <p:nvPicPr>
+          <p:cNvPr id="65" name="Shape 65" descr="DC801-Minibadge-Front-Basic.png"/>
+          <p:cNvPicPr preferRelativeResize="0"/>
+          <p:nvPr/>
+        </p:nvPicPr>
+        <p:blipFill>
+          <a:blip r:embed="rId4">
+            <a:alphaModFix/>
+          </a:blip>
+          <a:stretch>
+            <a:fillRect/>
+          </a:stretch>
+        </p:blipFill>
+        <p:spPr>
+          <a:xfrm>
+            <a:off x="0" y="4345550"/>
+            <a:ext cx="789065" cy="765576"/>
+          </a:xfrm>
+          <a:prstGeom prst="rect">
+            <a:avLst/>
+          </a:prstGeom>
+          <a:noFill/>
+          <a:ln>
+            <a:noFill/>
+          </a:ln>
+        </p:spPr>
+      </p:pic>
+      <p:sp>
+        <p:nvSpPr>
+          <p:cNvPr id="66" name="Shape 66"/>
+          <p:cNvSpPr txBox="1"/>
+          <p:nvPr/>
+        </p:nvSpPr>
+        <p:spPr>
+          <a:xfrm>
+            <a:off x="6944025" y="4735825"/>
+            <a:ext cx="1560600" cy="320400"/>
+          </a:xfrm>
+          <a:prstGeom prst="rect">
+            <a:avLst/>
+          </a:prstGeom>
+          <a:noFill/>
+          <a:ln>
+            <a:noFill/>
+          </a:ln>
+        </p:spPr>
+        <p:txBody>
+          <a:bodyPr wrap="square" lIns="91425" tIns="91425" rIns="91425" bIns="91425" anchor="t" anchorCtr="0">
+            <a:noAutofit/>
+          </a:bodyPr>
+          <a:lstStyle/>
+          <a:p>
+            <a:pPr lvl="0" rtl="0">
+              <a:spcBef>
+                <a:spcPts val="0"/>
+              </a:spcBef>
+              <a:buNone/>
+            </a:pPr>
+            <a:r>
+              <a:rPr lang="en" sz="1800" dirty="0" smtClean="0">
+                <a:latin typeface="Calibri"/>
+                <a:ea typeface="Calibri"/>
+                <a:cs typeface="Calibri"/>
+                <a:sym typeface="Calibri"/>
+              </a:rPr>
+              <a:t>SMPS 101</a:t>
+            </a:r>
+            <a:endParaRPr lang="en" sz="1800" dirty="0">
+              <a:latin typeface="Calibri"/>
+              <a:ea typeface="Calibri"/>
+              <a:cs typeface="Calibri"/>
+              <a:sym typeface="Calibri"/>
+            </a:endParaRPr>
+          </a:p>
+        </p:txBody>
+      </p:sp>
+      <p:pic>
+        <p:nvPicPr>
+          <p:cNvPr id="9" name="Picture 8"/>
+          <p:cNvPicPr>
+            <a:picLocks noChangeAspect="1"/>
+          </p:cNvPicPr>
+          <p:nvPr/>
+        </p:nvPicPr>
+        <p:blipFill>
+          <a:blip r:embed="rId5">
+            <a:extLst>
+              <a:ext uri="{28A0092B-C50C-407E-A947-70E740481C1C}">
+                <a14:useLocalDpi xmlns:a14="http://schemas.microsoft.com/office/drawing/2010/main" val="0"/>
+              </a:ext>
+            </a:extLst>
+          </a:blip>
+          <a:stretch>
+            <a:fillRect/>
+          </a:stretch>
+        </p:blipFill>
+        <p:spPr>
+          <a:xfrm>
+            <a:off x="2337500" y="34083"/>
+            <a:ext cx="4422640" cy="4922459"/>
+          </a:xfrm>
+          <a:prstGeom prst="rect">
+            <a:avLst/>
+          </a:prstGeom>
+        </p:spPr>
+      </p:pic>
+    </p:spTree>
+    <p:extLst>
+      <p:ext uri="{BB962C8B-B14F-4D97-AF65-F5344CB8AC3E}">
+        <p14:creationId xmlns:p14="http://schemas.microsoft.com/office/powerpoint/2010/main" val="2858399476"/>
+      </p:ext>
+    </p:extLst>
+  </p:cSld>
+  <p:clrMapOvr>
+    <a:masterClrMapping/>
+  </p:clrMapOvr>
+  <p:timing>
+    <p:tnLst>
+      <p:par>
+        <p:cTn id="1" dur="indefinite" restart="never" nodeType="tmRoot"/>
+      </p:par>
+    </p:tnLst>
+  </p:timing>
+</p:sld>
+</file>
+
+<file path=ppt/slides/slide13.xml><?xml version="1.0" encoding="utf-8"?>
 <p:sld xmlns:a="http://schemas.openxmlformats.org/drawingml/2006/main" xmlns:r="http://schemas.openxmlformats.org/officeDocument/2006/relationships" xmlns:p="http://schemas.openxmlformats.org/presentationml/2006/main">
   <p:cSld>
     <p:spTree>
@@ -7643,12 +7946,6 @@
               </a:rPr>
               <a:t>- A capacitor</a:t>
             </a:r>
-            <a:endParaRPr lang="en" dirty="0" smtClean="0">
-              <a:latin typeface="Calibri"/>
-              <a:ea typeface="Calibri"/>
-              <a:cs typeface="Calibri"/>
-              <a:sym typeface="Calibri"/>
-            </a:endParaRPr>
           </a:p>
           <a:p>
             <a:pPr lvl="0">
@@ -7780,433 +8077,6 @@
     <p:extLst>
       <p:ext uri="{BB962C8B-B14F-4D97-AF65-F5344CB8AC3E}">
         <p14:creationId xmlns:p14="http://schemas.microsoft.com/office/powerpoint/2010/main" val="515866399"/>
-      </p:ext>
-    </p:extLst>
-  </p:cSld>
-  <p:clrMapOvr>
-    <a:masterClrMapping/>
-  </p:clrMapOvr>
-  <p:timing>
-    <p:tnLst>
-      <p:par>
-        <p:cTn id="1" dur="indefinite" restart="never" nodeType="tmRoot"/>
-      </p:par>
-    </p:tnLst>
-  </p:timing>
-</p:sld>
-</file>
-
-<file path=ppt/slides/slide13.xml><?xml version="1.0" encoding="utf-8"?>
-<p:sld xmlns:a="http://schemas.openxmlformats.org/drawingml/2006/main" xmlns:r="http://schemas.openxmlformats.org/officeDocument/2006/relationships" xmlns:p="http://schemas.openxmlformats.org/presentationml/2006/main">
-  <p:cSld>
-    <p:spTree>
-      <p:nvGrpSpPr>
-        <p:cNvPr id="1" name="Shape 60"/>
-        <p:cNvGrpSpPr/>
-        <p:nvPr/>
-      </p:nvGrpSpPr>
-      <p:grpSpPr>
-        <a:xfrm>
-          <a:off x="0" y="0"/>
-          <a:ext cx="0" cy="0"/>
-          <a:chOff x="0" y="0"/>
-          <a:chExt cx="0" cy="0"/>
-        </a:xfrm>
-      </p:grpSpPr>
-      <p:sp>
-        <p:nvSpPr>
-          <p:cNvPr id="61" name="Shape 61"/>
-          <p:cNvSpPr txBox="1"/>
-          <p:nvPr/>
-        </p:nvSpPr>
-        <p:spPr>
-          <a:xfrm>
-            <a:off x="0" y="4313150"/>
-            <a:ext cx="9144000" cy="830400"/>
-          </a:xfrm>
-          <a:prstGeom prst="rect">
-            <a:avLst/>
-          </a:prstGeom>
-          <a:solidFill>
-            <a:srgbClr val="999999"/>
-          </a:solidFill>
-          <a:ln>
-            <a:noFill/>
-          </a:ln>
-        </p:spPr>
-        <p:txBody>
-          <a:bodyPr wrap="square" lIns="91425" tIns="91425" rIns="91425" bIns="91425" anchor="t" anchorCtr="0">
-            <a:noAutofit/>
-          </a:bodyPr>
-          <a:lstStyle/>
-          <a:p>
-            <a:pPr lvl="0" rtl="0">
-              <a:spcBef>
-                <a:spcPts val="0"/>
-              </a:spcBef>
-              <a:buNone/>
-            </a:pPr>
-            <a:endParaRPr/>
-          </a:p>
-        </p:txBody>
-      </p:sp>
-      <p:sp>
-        <p:nvSpPr>
-          <p:cNvPr id="62" name="Shape 62"/>
-          <p:cNvSpPr txBox="1">
-            <a:spLocks noGrp="1"/>
-          </p:cNvSpPr>
-          <p:nvPr>
-            <p:ph type="title"/>
-          </p:nvPr>
-        </p:nvSpPr>
-        <p:spPr>
-          <a:xfrm>
-            <a:off x="311700" y="131475"/>
-            <a:ext cx="8520600" cy="546000"/>
-          </a:xfrm>
-          <a:prstGeom prst="rect">
-            <a:avLst/>
-          </a:prstGeom>
-        </p:spPr>
-        <p:txBody>
-          <a:bodyPr wrap="square" lIns="91425" tIns="91425" rIns="91425" bIns="91425" anchor="t" anchorCtr="0">
-            <a:noAutofit/>
-          </a:bodyPr>
-          <a:lstStyle/>
-          <a:p>
-            <a:pPr lvl="0" rtl="0">
-              <a:spcBef>
-                <a:spcPts val="0"/>
-              </a:spcBef>
-              <a:buClr>
-                <a:schemeClr val="dk1"/>
-              </a:buClr>
-              <a:buSzPts val="1100"/>
-              <a:buFont typeface="Arial"/>
-              <a:buNone/>
-            </a:pPr>
-            <a:r>
-              <a:rPr lang="en-US" dirty="0" smtClean="0">
-                <a:latin typeface="Calibri"/>
-                <a:ea typeface="Calibri"/>
-                <a:cs typeface="Calibri"/>
-                <a:sym typeface="Calibri"/>
-              </a:rPr>
-              <a:t>B</a:t>
-            </a:r>
-            <a:r>
-              <a:rPr lang="en" dirty="0" smtClean="0">
-                <a:latin typeface="Calibri"/>
-                <a:ea typeface="Calibri"/>
-                <a:cs typeface="Calibri"/>
-                <a:sym typeface="Calibri"/>
-              </a:rPr>
-              <a:t>uck converter operation</a:t>
-            </a:r>
-            <a:endParaRPr lang="en" dirty="0">
-              <a:latin typeface="Calibri"/>
-              <a:ea typeface="Calibri"/>
-              <a:cs typeface="Calibri"/>
-              <a:sym typeface="Calibri"/>
-            </a:endParaRPr>
-          </a:p>
-        </p:txBody>
-      </p:sp>
-      <p:sp>
-        <p:nvSpPr>
-          <p:cNvPr id="63" name="Shape 63"/>
-          <p:cNvSpPr txBox="1">
-            <a:spLocks noGrp="1"/>
-          </p:cNvSpPr>
-          <p:nvPr>
-            <p:ph type="body" idx="1"/>
-          </p:nvPr>
-        </p:nvSpPr>
-        <p:spPr>
-          <a:xfrm>
-            <a:off x="105196" y="677002"/>
-            <a:ext cx="5445939" cy="3635675"/>
-          </a:xfrm>
-          <a:prstGeom prst="rect">
-            <a:avLst/>
-          </a:prstGeom>
-        </p:spPr>
-        <p:txBody>
-          <a:bodyPr wrap="square" lIns="91425" tIns="91425" rIns="91425" bIns="91425" anchor="t" anchorCtr="0">
-            <a:noAutofit/>
-          </a:bodyPr>
-          <a:lstStyle/>
-          <a:p>
-            <a:pPr lvl="0">
-              <a:spcBef>
-                <a:spcPts val="0"/>
-              </a:spcBef>
-              <a:buClr>
-                <a:schemeClr val="dk1"/>
-              </a:buClr>
-              <a:buSzPts val="1100"/>
-              <a:buFont typeface="Arial"/>
-              <a:buNone/>
-            </a:pPr>
-            <a:r>
-              <a:rPr lang="en" dirty="0" smtClean="0">
-                <a:latin typeface="Calibri"/>
-                <a:ea typeface="Calibri"/>
-                <a:cs typeface="Calibri"/>
-                <a:sym typeface="Calibri"/>
-              </a:rPr>
-              <a:t>Theory of operation</a:t>
-            </a:r>
-          </a:p>
-          <a:p>
-            <a:pPr lvl="0">
-              <a:spcBef>
-                <a:spcPts val="0"/>
-              </a:spcBef>
-              <a:buClr>
-                <a:schemeClr val="dk1"/>
-              </a:buClr>
-              <a:buSzPts val="1100"/>
-              <a:buFont typeface="Arial"/>
-              <a:buNone/>
-            </a:pPr>
-            <a:r>
-              <a:rPr lang="en" dirty="0" smtClean="0">
-                <a:latin typeface="Calibri"/>
-                <a:ea typeface="Calibri"/>
-                <a:cs typeface="Calibri"/>
-                <a:sym typeface="Calibri"/>
-              </a:rPr>
-              <a:t>Only want some of the power?  Just sip from the firehose!</a:t>
-            </a:r>
-          </a:p>
-          <a:p>
-            <a:pPr lvl="0">
-              <a:spcBef>
-                <a:spcPts val="0"/>
-              </a:spcBef>
-              <a:buClr>
-                <a:schemeClr val="dk1"/>
-              </a:buClr>
-              <a:buSzPts val="1100"/>
-              <a:buFont typeface="Arial"/>
-              <a:buNone/>
-            </a:pPr>
-            <a:r>
-              <a:rPr lang="en" dirty="0" smtClean="0">
-                <a:latin typeface="Calibri"/>
-                <a:ea typeface="Calibri"/>
-                <a:cs typeface="Calibri"/>
-                <a:sym typeface="Calibri"/>
-              </a:rPr>
-              <a:t>On State – Directly connected to load.  As soon as the output voltage hits the limit, turn it off.</a:t>
-            </a:r>
-          </a:p>
-          <a:p>
-            <a:pPr lvl="0">
-              <a:spcBef>
-                <a:spcPts val="0"/>
-              </a:spcBef>
-              <a:buClr>
-                <a:schemeClr val="dk1"/>
-              </a:buClr>
-              <a:buSzPts val="1100"/>
-              <a:buFont typeface="Arial"/>
-              <a:buNone/>
-            </a:pPr>
-            <a:r>
-              <a:rPr lang="en" dirty="0" smtClean="0">
-                <a:latin typeface="Calibri"/>
-                <a:ea typeface="Calibri"/>
-                <a:cs typeface="Calibri"/>
-                <a:sym typeface="Calibri"/>
-              </a:rPr>
-              <a:t>Off State – The capacitor ‘tanks’ voltage, the inductor ‘tanks’ current – for a short while</a:t>
-            </a:r>
-          </a:p>
-          <a:p>
-            <a:pPr lvl="0">
-              <a:spcBef>
-                <a:spcPts val="0"/>
-              </a:spcBef>
-              <a:buClr>
-                <a:schemeClr val="dk1"/>
-              </a:buClr>
-              <a:buSzPts val="1100"/>
-              <a:buFont typeface="Arial"/>
-              <a:buNone/>
-            </a:pPr>
-            <a:r>
-              <a:rPr lang="en" dirty="0" smtClean="0">
-                <a:latin typeface="Calibri"/>
-                <a:ea typeface="Calibri"/>
-                <a:cs typeface="Calibri"/>
-                <a:sym typeface="Calibri"/>
-              </a:rPr>
-              <a:t>The diode keeps current flowing in the right direction</a:t>
-            </a:r>
-          </a:p>
-          <a:p>
-            <a:pPr lvl="0">
-              <a:spcBef>
-                <a:spcPts val="0"/>
-              </a:spcBef>
-              <a:buClr>
-                <a:schemeClr val="dk1"/>
-              </a:buClr>
-              <a:buSzPts val="1100"/>
-              <a:buFont typeface="Arial"/>
-              <a:buNone/>
-            </a:pPr>
-            <a:endParaRPr lang="en" dirty="0">
-              <a:latin typeface="Calibri"/>
-              <a:ea typeface="Calibri"/>
-              <a:cs typeface="Calibri"/>
-              <a:sym typeface="Calibri"/>
-            </a:endParaRPr>
-          </a:p>
-        </p:txBody>
-      </p:sp>
-      <p:pic>
-        <p:nvPicPr>
-          <p:cNvPr id="64" name="Shape 64" descr="hamster-university-01.png"/>
-          <p:cNvPicPr preferRelativeResize="0"/>
-          <p:nvPr/>
-        </p:nvPicPr>
-        <p:blipFill>
-          <a:blip r:embed="rId3">
-            <a:alphaModFix/>
-          </a:blip>
-          <a:stretch>
-            <a:fillRect/>
-          </a:stretch>
-        </p:blipFill>
-        <p:spPr>
-          <a:xfrm>
-            <a:off x="8308575" y="4313200"/>
-            <a:ext cx="835425" cy="830300"/>
-          </a:xfrm>
-          <a:prstGeom prst="rect">
-            <a:avLst/>
-          </a:prstGeom>
-          <a:noFill/>
-          <a:ln>
-            <a:noFill/>
-          </a:ln>
-        </p:spPr>
-      </p:pic>
-      <p:pic>
-        <p:nvPicPr>
-          <p:cNvPr id="65" name="Shape 65" descr="DC801-Minibadge-Front-Basic.png"/>
-          <p:cNvPicPr preferRelativeResize="0"/>
-          <p:nvPr/>
-        </p:nvPicPr>
-        <p:blipFill>
-          <a:blip r:embed="rId4">
-            <a:alphaModFix/>
-          </a:blip>
-          <a:stretch>
-            <a:fillRect/>
-          </a:stretch>
-        </p:blipFill>
-        <p:spPr>
-          <a:xfrm>
-            <a:off x="0" y="4345550"/>
-            <a:ext cx="789065" cy="765576"/>
-          </a:xfrm>
-          <a:prstGeom prst="rect">
-            <a:avLst/>
-          </a:prstGeom>
-          <a:noFill/>
-          <a:ln>
-            <a:noFill/>
-          </a:ln>
-        </p:spPr>
-      </p:pic>
-      <p:sp>
-        <p:nvSpPr>
-          <p:cNvPr id="66" name="Shape 66"/>
-          <p:cNvSpPr txBox="1"/>
-          <p:nvPr/>
-        </p:nvSpPr>
-        <p:spPr>
-          <a:xfrm>
-            <a:off x="6944025" y="4735825"/>
-            <a:ext cx="1560600" cy="320400"/>
-          </a:xfrm>
-          <a:prstGeom prst="rect">
-            <a:avLst/>
-          </a:prstGeom>
-          <a:noFill/>
-          <a:ln>
-            <a:noFill/>
-          </a:ln>
-        </p:spPr>
-        <p:txBody>
-          <a:bodyPr wrap="square" lIns="91425" tIns="91425" rIns="91425" bIns="91425" anchor="t" anchorCtr="0">
-            <a:noAutofit/>
-          </a:bodyPr>
-          <a:lstStyle/>
-          <a:p>
-            <a:pPr lvl="0" rtl="0">
-              <a:spcBef>
-                <a:spcPts val="0"/>
-              </a:spcBef>
-              <a:buNone/>
-            </a:pPr>
-            <a:r>
-              <a:rPr lang="en" sz="1800" dirty="0" smtClean="0">
-                <a:latin typeface="Calibri"/>
-                <a:ea typeface="Calibri"/>
-                <a:cs typeface="Calibri"/>
-                <a:sym typeface="Calibri"/>
-              </a:rPr>
-              <a:t>SMPS 101</a:t>
-            </a:r>
-            <a:endParaRPr lang="en" sz="1800" dirty="0">
-              <a:latin typeface="Calibri"/>
-              <a:ea typeface="Calibri"/>
-              <a:cs typeface="Calibri"/>
-              <a:sym typeface="Calibri"/>
-            </a:endParaRPr>
-          </a:p>
-        </p:txBody>
-      </p:sp>
-      <p:pic>
-        <p:nvPicPr>
-          <p:cNvPr id="3" name="Picture 2"/>
-          <p:cNvPicPr>
-            <a:picLocks noChangeAspect="1"/>
-          </p:cNvPicPr>
-          <p:nvPr/>
-        </p:nvPicPr>
-        <p:blipFill>
-          <a:blip r:embed="rId5">
-            <a:extLst>
-              <a:ext uri="{28A0092B-C50C-407E-A947-70E740481C1C}">
-                <a14:useLocalDpi xmlns:a14="http://schemas.microsoft.com/office/drawing/2010/main" val="0"/>
-              </a:ext>
-            </a:extLst>
-          </a:blip>
-          <a:stretch>
-            <a:fillRect/>
-          </a:stretch>
-        </p:blipFill>
-        <p:spPr>
-          <a:xfrm>
-            <a:off x="4964620" y="677475"/>
-            <a:ext cx="4280687" cy="3210516"/>
-          </a:xfrm>
-          <a:prstGeom prst="rect">
-            <a:avLst/>
-          </a:prstGeom>
-        </p:spPr>
-      </p:pic>
-    </p:spTree>
-    <p:extLst>
-      <p:ext uri="{BB962C8B-B14F-4D97-AF65-F5344CB8AC3E}">
-        <p14:creationId xmlns:p14="http://schemas.microsoft.com/office/powerpoint/2010/main" val="2417550527"/>
       </p:ext>
     </p:extLst>
   </p:cSld>
@@ -8320,7 +8190,16 @@
                 <a:cs typeface="Calibri"/>
                 <a:sym typeface="Calibri"/>
               </a:rPr>
-              <a:t>Boost converter topology</a:t>
+              <a:t>B</a:t>
+            </a:r>
+            <a:r>
+              <a:rPr lang="en" dirty="0" smtClean="0">
+                <a:latin typeface="Calibri"/>
+                <a:ea typeface="Calibri"/>
+                <a:cs typeface="Calibri"/>
+                <a:sym typeface="Calibri"/>
+              </a:rPr>
+              <a:t>uck converter operation</a:t>
             </a:r>
             <a:endParaRPr lang="en" dirty="0">
               <a:latin typeface="Calibri"/>
@@ -8343,8 +8222,8 @@
         </p:nvSpPr>
         <p:spPr>
           <a:xfrm>
-            <a:off x="169932" y="1814918"/>
-            <a:ext cx="2824120" cy="1894026"/>
+            <a:off x="105196" y="677002"/>
+            <a:ext cx="5445939" cy="3635675"/>
           </a:xfrm>
           <a:prstGeom prst="rect">
             <a:avLst/>
@@ -8374,7 +8253,7 @@
                 <a:cs typeface="Calibri"/>
                 <a:sym typeface="Calibri"/>
               </a:rPr>
-              <a:t>Same parts as the buck</a:t>
+              <a:t>Theory of operation</a:t>
             </a:r>
           </a:p>
           <a:p>
@@ -8396,8 +8275,102 @@
                 <a:cs typeface="Calibri"/>
                 <a:sym typeface="Calibri"/>
               </a:rPr>
-              <a:t>New exciting wiring configuration</a:t>
+              <a:t>Only want some of the power?  Just sip from the firehose!</a:t>
             </a:r>
+          </a:p>
+          <a:p>
+            <a:pPr lvl="0">
+              <a:spcBef>
+                <a:spcPts val="0"/>
+              </a:spcBef>
+              <a:buClr>
+                <a:schemeClr val="dk1"/>
+              </a:buClr>
+              <a:buSzPts val="1100"/>
+              <a:buFont typeface="Arial"/>
+              <a:buNone/>
+            </a:pPr>
+            <a:r>
+              <a:rPr lang="en" dirty="0" smtClean="0">
+                <a:latin typeface="Calibri"/>
+                <a:ea typeface="Calibri"/>
+                <a:cs typeface="Calibri"/>
+                <a:sym typeface="Calibri"/>
+              </a:rPr>
+              <a:t>On State – Directly connected to load.  As soon as the output voltage hits the limit, turn it off.</a:t>
+            </a:r>
+          </a:p>
+          <a:p>
+            <a:pPr lvl="0">
+              <a:spcBef>
+                <a:spcPts val="0"/>
+              </a:spcBef>
+              <a:buClr>
+                <a:schemeClr val="dk1"/>
+              </a:buClr>
+              <a:buSzPts val="1100"/>
+              <a:buFont typeface="Arial"/>
+              <a:buNone/>
+            </a:pPr>
+            <a:r>
+              <a:rPr lang="en" dirty="0" smtClean="0">
+                <a:latin typeface="Calibri"/>
+                <a:ea typeface="Calibri"/>
+                <a:cs typeface="Calibri"/>
+                <a:sym typeface="Calibri"/>
+              </a:rPr>
+              <a:t>Off State – The capacitor ‘tanks’ voltage, the inductor ‘tanks’ current – for a short while</a:t>
+            </a:r>
+          </a:p>
+          <a:p>
+            <a:pPr lvl="0">
+              <a:spcBef>
+                <a:spcPts val="0"/>
+              </a:spcBef>
+              <a:buClr>
+                <a:schemeClr val="dk1"/>
+              </a:buClr>
+              <a:buSzPts val="1100"/>
+              <a:buFont typeface="Arial"/>
+              <a:buNone/>
+            </a:pPr>
+            <a:r>
+              <a:rPr lang="en" dirty="0" smtClean="0">
+                <a:latin typeface="Calibri"/>
+                <a:ea typeface="Calibri"/>
+                <a:cs typeface="Calibri"/>
+                <a:sym typeface="Calibri"/>
+              </a:rPr>
+              <a:t>The diode </a:t>
+            </a:r>
+            <a:r>
+              <a:rPr lang="en" dirty="0" smtClean="0">
+                <a:latin typeface="Calibri"/>
+                <a:ea typeface="Calibri"/>
+                <a:cs typeface="Calibri"/>
+                <a:sym typeface="Calibri"/>
+              </a:rPr>
+              <a:t>completes the circuit when the switch is open</a:t>
+            </a:r>
+            <a:endParaRPr lang="en" dirty="0" smtClean="0">
+              <a:latin typeface="Calibri"/>
+              <a:ea typeface="Calibri"/>
+              <a:cs typeface="Calibri"/>
+              <a:sym typeface="Calibri"/>
+            </a:endParaRPr>
+          </a:p>
+          <a:p>
+            <a:pPr lvl="0">
+              <a:spcBef>
+                <a:spcPts val="0"/>
+              </a:spcBef>
+              <a:buClr>
+                <a:schemeClr val="dk1"/>
+              </a:buClr>
+              <a:buSzPts val="1100"/>
+              <a:buFont typeface="Arial"/>
+              <a:buNone/>
+            </a:pPr>
             <a:endParaRPr lang="en" dirty="0">
               <a:latin typeface="Calibri"/>
               <a:ea typeface="Calibri"/>
@@ -8534,8 +8507,8 @@
         </p:blipFill>
         <p:spPr>
           <a:xfrm>
-            <a:off x="3271593" y="1160300"/>
-            <a:ext cx="5560707" cy="2427812"/>
+            <a:off x="4964620" y="677475"/>
+            <a:ext cx="4280687" cy="3210516"/>
           </a:xfrm>
           <a:prstGeom prst="rect">
             <a:avLst/>
@@ -8545,7 +8518,7 @@
     </p:spTree>
     <p:extLst>
       <p:ext uri="{BB962C8B-B14F-4D97-AF65-F5344CB8AC3E}">
-        <p14:creationId xmlns:p14="http://schemas.microsoft.com/office/powerpoint/2010/main" val="3275646379"/>
+        <p14:creationId xmlns:p14="http://schemas.microsoft.com/office/powerpoint/2010/main" val="2417550527"/>
       </p:ext>
     </p:extLst>
   </p:cSld>
@@ -8659,8 +8632,53 @@
                 <a:cs typeface="Calibri"/>
                 <a:sym typeface="Calibri"/>
               </a:rPr>
-              <a:t>Boost </a:t>
+              <a:t>Boost converter topology</a:t>
             </a:r>
+            <a:endParaRPr lang="en" dirty="0">
+              <a:latin typeface="Calibri"/>
+              <a:ea typeface="Calibri"/>
+              <a:cs typeface="Calibri"/>
+              <a:sym typeface="Calibri"/>
+            </a:endParaRPr>
+          </a:p>
+        </p:txBody>
+      </p:sp>
+      <p:sp>
+        <p:nvSpPr>
+          <p:cNvPr id="63" name="Shape 63"/>
+          <p:cNvSpPr txBox="1">
+            <a:spLocks noGrp="1"/>
+          </p:cNvSpPr>
+          <p:nvPr>
+            <p:ph type="body" idx="1"/>
+          </p:nvPr>
+        </p:nvSpPr>
+        <p:spPr>
+          <a:xfrm>
+            <a:off x="169932" y="1814918"/>
+            <a:ext cx="2824120" cy="1894026"/>
+          </a:xfrm>
+          <a:prstGeom prst="rect">
+            <a:avLst/>
+          </a:prstGeom>
+        </p:spPr>
+        <p:txBody>
+          <a:bodyPr wrap="square" lIns="91425" tIns="91425" rIns="91425" bIns="91425" anchor="t" anchorCtr="0">
+            <a:noAutofit/>
+          </a:bodyPr>
+          <a:lstStyle/>
+          <a:p>
+            <a:pPr lvl="0">
+              <a:spcBef>
+                <a:spcPts val="0"/>
+              </a:spcBef>
+              <a:buClr>
+                <a:schemeClr val="dk1"/>
+              </a:buClr>
+              <a:buSzPts val="1100"/>
+              <a:buFont typeface="Arial"/>
+              <a:buNone/>
+            </a:pPr>
             <a:r>
               <a:rPr lang="en" dirty="0" smtClean="0">
                 <a:latin typeface="Calibri"/>
@@ -8668,41 +8686,9 @@
                 <a:cs typeface="Calibri"/>
                 <a:sym typeface="Calibri"/>
               </a:rPr>
-              <a:t>converter operation</a:t>
+              <a:t>Same parts as the buck</a:t>
             </a:r>
-            <a:endParaRPr lang="en" dirty="0">
-              <a:latin typeface="Calibri"/>
-              <a:ea typeface="Calibri"/>
-              <a:cs typeface="Calibri"/>
-              <a:sym typeface="Calibri"/>
-            </a:endParaRPr>
-          </a:p>
-        </p:txBody>
-      </p:sp>
-      <p:sp>
-        <p:nvSpPr>
-          <p:cNvPr id="63" name="Shape 63"/>
-          <p:cNvSpPr txBox="1">
-            <a:spLocks noGrp="1"/>
-          </p:cNvSpPr>
-          <p:nvPr>
-            <p:ph type="body" idx="1"/>
-          </p:nvPr>
-        </p:nvSpPr>
-        <p:spPr>
-          <a:xfrm>
-            <a:off x="105196" y="677003"/>
-            <a:ext cx="5445939" cy="3603724"/>
-          </a:xfrm>
-          <a:prstGeom prst="rect">
-            <a:avLst/>
-          </a:prstGeom>
-        </p:spPr>
-        <p:txBody>
-          <a:bodyPr wrap="square" lIns="91425" tIns="91425" rIns="91425" bIns="91425" anchor="t" anchorCtr="0">
-            <a:noAutofit/>
-          </a:bodyPr>
-          <a:lstStyle/>
+          </a:p>
           <a:p>
             <a:pPr lvl="0">
               <a:spcBef>
@@ -8722,95 +8708,7 @@
                 <a:cs typeface="Calibri"/>
                 <a:sym typeface="Calibri"/>
               </a:rPr>
-              <a:t>Theory of operation</a:t>
-            </a:r>
-          </a:p>
-          <a:p>
-            <a:pPr lvl="0">
-              <a:spcBef>
-                <a:spcPts val="0"/>
-              </a:spcBef>
-              <a:buClr>
-                <a:schemeClr val="dk1"/>
-              </a:buClr>
-              <a:buSzPts val="1100"/>
-              <a:buFont typeface="Arial"/>
-              <a:buNone/>
-            </a:pPr>
-            <a:r>
-              <a:rPr lang="en" dirty="0" smtClean="0">
-                <a:latin typeface="Calibri"/>
-                <a:ea typeface="Calibri"/>
-                <a:cs typeface="Calibri"/>
-                <a:sym typeface="Calibri"/>
-              </a:rPr>
-              <a:t>Make the inductor work for you</a:t>
-            </a:r>
-          </a:p>
-          <a:p>
-            <a:pPr lvl="0">
-              <a:spcBef>
-                <a:spcPts val="0"/>
-              </a:spcBef>
-              <a:buClr>
-                <a:schemeClr val="dk1"/>
-              </a:buClr>
-              <a:buSzPts val="1100"/>
-              <a:buFont typeface="Arial"/>
-              <a:buNone/>
-            </a:pPr>
-            <a:r>
-              <a:rPr lang="en" dirty="0" smtClean="0">
-                <a:latin typeface="Calibri"/>
-                <a:ea typeface="Calibri"/>
-                <a:cs typeface="Calibri"/>
-                <a:sym typeface="Calibri"/>
-              </a:rPr>
-              <a:t>On State – Short-circuit input into coil to build magnetic field (be mindful of saturation!)</a:t>
-            </a:r>
-          </a:p>
-          <a:p>
-            <a:pPr lvl="0">
-              <a:spcBef>
-                <a:spcPts val="0"/>
-              </a:spcBef>
-              <a:buClr>
-                <a:schemeClr val="dk1"/>
-              </a:buClr>
-              <a:buSzPts val="1100"/>
-              <a:buFont typeface="Arial"/>
-              <a:buNone/>
-            </a:pPr>
-            <a:r>
-              <a:rPr lang="en" dirty="0" smtClean="0">
-                <a:latin typeface="Calibri"/>
-                <a:ea typeface="Calibri"/>
-                <a:cs typeface="Calibri"/>
-                <a:sym typeface="Calibri"/>
-              </a:rPr>
-              <a:t>Off State – The inductor tries to keep the current stable by increasing output voltage. The diode steers the ‘boosted’ voltage into the capacitor ‘tank’</a:t>
-            </a:r>
-          </a:p>
-          <a:p>
-            <a:pPr lvl="0">
-              <a:spcBef>
-                <a:spcPts val="0"/>
-              </a:spcBef>
-              <a:buClr>
-                <a:schemeClr val="dk1"/>
-              </a:buClr>
-              <a:buSzPts val="1100"/>
-              <a:buFont typeface="Arial"/>
-              <a:buNone/>
-            </a:pPr>
-            <a:r>
-              <a:rPr lang="en" dirty="0" smtClean="0">
-                <a:latin typeface="Calibri"/>
-                <a:ea typeface="Calibri"/>
-                <a:cs typeface="Calibri"/>
-                <a:sym typeface="Calibri"/>
-              </a:rPr>
-              <a:t>No load = output voltage going to the moon</a:t>
+              <a:t>New exciting wiring configuration</a:t>
             </a:r>
             <a:endParaRPr lang="en" dirty="0">
               <a:latin typeface="Calibri"/>
@@ -8928,7 +8826,7 @@
       </p:sp>
       <p:pic>
         <p:nvPicPr>
-          <p:cNvPr id="2" name="Picture 1"/>
+          <p:cNvPr id="3" name="Picture 2"/>
           <p:cNvPicPr>
             <a:picLocks noChangeAspect="1"/>
           </p:cNvPicPr>
@@ -8948,8 +8846,8 @@
         </p:blipFill>
         <p:spPr>
           <a:xfrm>
-            <a:off x="5757639" y="677003"/>
-            <a:ext cx="3074661" cy="3222245"/>
+            <a:off x="3271593" y="1160300"/>
+            <a:ext cx="5560707" cy="2427812"/>
           </a:xfrm>
           <a:prstGeom prst="rect">
             <a:avLst/>
@@ -8959,7 +8857,7 @@
     </p:spTree>
     <p:extLst>
       <p:ext uri="{BB962C8B-B14F-4D97-AF65-F5344CB8AC3E}">
-        <p14:creationId xmlns:p14="http://schemas.microsoft.com/office/powerpoint/2010/main" val="1326420266"/>
+        <p14:creationId xmlns:p14="http://schemas.microsoft.com/office/powerpoint/2010/main" val="3275646379"/>
       </p:ext>
     </p:extLst>
   </p:cSld>
@@ -9073,7 +8971,16 @@
                 <a:cs typeface="Calibri"/>
                 <a:sym typeface="Calibri"/>
               </a:rPr>
-              <a:t>Other topologies</a:t>
+              <a:t>Boost </a:t>
+            </a:r>
+            <a:r>
+              <a:rPr lang="en" dirty="0" smtClean="0">
+                <a:latin typeface="Calibri"/>
+                <a:ea typeface="Calibri"/>
+                <a:cs typeface="Calibri"/>
+                <a:sym typeface="Calibri"/>
+              </a:rPr>
+              <a:t>converter operation</a:t>
             </a:r>
             <a:endParaRPr lang="en" dirty="0">
               <a:latin typeface="Calibri"/>
@@ -9096,8 +9003,8 @@
         </p:nvSpPr>
         <p:spPr>
           <a:xfrm>
-            <a:off x="2201034" y="1100100"/>
-            <a:ext cx="5381204" cy="2930101"/>
+            <a:off x="105196" y="677003"/>
+            <a:ext cx="5445939" cy="3603724"/>
           </a:xfrm>
           <a:prstGeom prst="rect">
             <a:avLst/>
@@ -9127,72 +9034,111 @@
                 <a:cs typeface="Calibri"/>
                 <a:sym typeface="Calibri"/>
               </a:rPr>
-              <a:t>Buck/Boost – a bit of both</a:t>
+              <a:t>Theory of operation</a:t>
             </a:r>
           </a:p>
           <a:p>
             <a:pPr lvl="0">
+              <a:spcBef>
+                <a:spcPts val="0"/>
+              </a:spcBef>
               <a:buClr>
                 <a:schemeClr val="dk1"/>
               </a:buClr>
               <a:buSzPts val="1100"/>
+              <a:buFont typeface="Arial"/>
               <a:buNone/>
             </a:pPr>
             <a:r>
-              <a:rPr lang="en-US" dirty="0" err="1" smtClean="0">
+              <a:rPr lang="en" dirty="0" smtClean="0">
                 <a:latin typeface="Calibri"/>
                 <a:ea typeface="Calibri"/>
                 <a:cs typeface="Calibri"/>
                 <a:sym typeface="Calibri"/>
               </a:rPr>
-              <a:t>Ćuk</a:t>
+              <a:t>Make the inductor work for you</a:t>
             </a:r>
+          </a:p>
+          <a:p>
+            <a:pPr lvl="0">
+              <a:spcBef>
+                <a:spcPts val="0"/>
+              </a:spcBef>
+              <a:buClr>
+                <a:schemeClr val="dk1"/>
+              </a:buClr>
+              <a:buSzPts val="1100"/>
+              <a:buFont typeface="Arial"/>
+              <a:buNone/>
+            </a:pPr>
             <a:r>
-              <a:rPr lang="en-US" dirty="0" smtClean="0">
+              <a:rPr lang="en" dirty="0" smtClean="0">
                 <a:latin typeface="Calibri"/>
                 <a:ea typeface="Calibri"/>
                 <a:cs typeface="Calibri"/>
                 <a:sym typeface="Calibri"/>
               </a:rPr>
-              <a:t> – (chook) a Buck/Boost but negative output</a:t>
+              <a:t>On State – Short-circuit input into coil to build magnetic field (be mindful of saturation!)</a:t>
             </a:r>
           </a:p>
           <a:p>
             <a:pPr lvl="0">
+              <a:spcBef>
+                <a:spcPts val="0"/>
+              </a:spcBef>
               <a:buClr>
                 <a:schemeClr val="dk1"/>
               </a:buClr>
               <a:buSzPts val="1100"/>
+              <a:buFont typeface="Arial"/>
               <a:buNone/>
             </a:pPr>
             <a:r>
-              <a:rPr lang="en-US" dirty="0" err="1" smtClean="0">
+              <a:rPr lang="en" dirty="0" smtClean="0">
                 <a:latin typeface="Calibri"/>
                 <a:ea typeface="Calibri"/>
                 <a:cs typeface="Calibri"/>
                 <a:sym typeface="Calibri"/>
               </a:rPr>
-              <a:t>Flyback</a:t>
+              <a:t>Off State – </a:t>
             </a:r>
             <a:r>
-              <a:rPr lang="en-US" dirty="0" smtClean="0">
+              <a:rPr lang="en" dirty="0" smtClean="0">
                 <a:latin typeface="Calibri"/>
                 <a:ea typeface="Calibri"/>
                 <a:cs typeface="Calibri"/>
                 <a:sym typeface="Calibri"/>
               </a:rPr>
-              <a:t> – Isolation of input/output via transformer</a:t>
+              <a:t>As the magnetic field in the inductor drops, it increases the voltage to keep the current through it stable</a:t>
             </a:r>
-          </a:p>
-          <a:p>
-            <a:pPr lvl="0">
-              <a:buClr>
-                <a:schemeClr val="dk1"/>
-              </a:buClr>
-              <a:buSzPts val="1100"/>
-              <a:buNone/>
-            </a:pPr>
-            <a:endParaRPr lang="en-US" dirty="0">
+            <a:r>
+              <a:rPr lang="en" dirty="0" smtClean="0">
+                <a:latin typeface="Calibri"/>
+                <a:ea typeface="Calibri"/>
+                <a:cs typeface="Calibri"/>
+                <a:sym typeface="Calibri"/>
+              </a:rPr>
+              <a:t>. </a:t>
+            </a:r>
+            <a:r>
+              <a:rPr lang="en" dirty="0" smtClean="0">
+                <a:latin typeface="Calibri"/>
+                <a:ea typeface="Calibri"/>
+                <a:cs typeface="Calibri"/>
+                <a:sym typeface="Calibri"/>
+              </a:rPr>
+              <a:t>The diode </a:t>
+            </a:r>
+            <a:r>
+              <a:rPr lang="en" dirty="0" smtClean="0">
+                <a:latin typeface="Calibri"/>
+                <a:ea typeface="Calibri"/>
+                <a:cs typeface="Calibri"/>
+                <a:sym typeface="Calibri"/>
+              </a:rPr>
+              <a:t>prevents back leakage.</a:t>
+            </a:r>
+            <a:endParaRPr lang="en" dirty="0" smtClean="0">
               <a:latin typeface="Calibri"/>
               <a:ea typeface="Calibri"/>
               <a:cs typeface="Calibri"/>
@@ -9201,20 +9147,24 @@
           </a:p>
           <a:p>
             <a:pPr lvl="0">
+              <a:spcBef>
+                <a:spcPts val="0"/>
+              </a:spcBef>
               <a:buClr>
                 <a:schemeClr val="dk1"/>
               </a:buClr>
               <a:buSzPts val="1100"/>
+              <a:buFont typeface="Arial"/>
               <a:buNone/>
             </a:pPr>
             <a:r>
-              <a:rPr lang="en-US" dirty="0" smtClean="0">
+              <a:rPr lang="en" dirty="0" smtClean="0">
                 <a:latin typeface="Calibri"/>
                 <a:ea typeface="Calibri"/>
                 <a:cs typeface="Calibri"/>
                 <a:sym typeface="Calibri"/>
               </a:rPr>
-              <a:t>Many, many variations…</a:t>
+              <a:t>No load = output voltage going to the moon</a:t>
             </a:r>
             <a:endParaRPr lang="en" dirty="0">
               <a:latin typeface="Calibri"/>
@@ -9330,10 +9280,40 @@
           </a:p>
         </p:txBody>
       </p:sp>
+      <p:pic>
+        <p:nvPicPr>
+          <p:cNvPr id="2" name="Picture 1"/>
+          <p:cNvPicPr>
+            <a:picLocks noChangeAspect="1"/>
+          </p:cNvPicPr>
+          <p:nvPr/>
+        </p:nvPicPr>
+        <p:blipFill>
+          <a:blip r:embed="rId5">
+            <a:extLst>
+              <a:ext uri="{28A0092B-C50C-407E-A947-70E740481C1C}">
+                <a14:useLocalDpi xmlns:a14="http://schemas.microsoft.com/office/drawing/2010/main" val="0"/>
+              </a:ext>
+            </a:extLst>
+          </a:blip>
+          <a:stretch>
+            <a:fillRect/>
+          </a:stretch>
+        </p:blipFill>
+        <p:spPr>
+          <a:xfrm>
+            <a:off x="5757639" y="677003"/>
+            <a:ext cx="3074661" cy="3222245"/>
+          </a:xfrm>
+          <a:prstGeom prst="rect">
+            <a:avLst/>
+          </a:prstGeom>
+        </p:spPr>
+      </p:pic>
     </p:spTree>
     <p:extLst>
       <p:ext uri="{BB962C8B-B14F-4D97-AF65-F5344CB8AC3E}">
-        <p14:creationId xmlns:p14="http://schemas.microsoft.com/office/powerpoint/2010/main" val="3205349303"/>
+        <p14:creationId xmlns:p14="http://schemas.microsoft.com/office/powerpoint/2010/main" val="1326420266"/>
       </p:ext>
     </p:extLst>
   </p:cSld>
@@ -9447,7 +9427,7 @@
                 <a:cs typeface="Calibri"/>
                 <a:sym typeface="Calibri"/>
               </a:rPr>
-              <a:t>Output Ripple</a:t>
+              <a:t>Other topologies</a:t>
             </a:r>
             <a:endParaRPr lang="en" dirty="0">
               <a:latin typeface="Calibri"/>
@@ -9470,8 +9450,8 @@
         </p:nvSpPr>
         <p:spPr>
           <a:xfrm>
-            <a:off x="80920" y="1060057"/>
-            <a:ext cx="3681876" cy="3034513"/>
+            <a:off x="2201034" y="1100100"/>
+            <a:ext cx="5381204" cy="2930101"/>
           </a:xfrm>
           <a:prstGeom prst="rect">
             <a:avLst/>
@@ -9501,73 +9481,94 @@
                 <a:cs typeface="Calibri"/>
                 <a:sym typeface="Calibri"/>
               </a:rPr>
-              <a:t>Ripple in output</a:t>
+              <a:t>Buck/Boost – a bit of both</a:t>
             </a:r>
           </a:p>
           <a:p>
             <a:pPr lvl="0">
-              <a:spcBef>
-                <a:spcPts val="0"/>
-              </a:spcBef>
               <a:buClr>
                 <a:schemeClr val="dk1"/>
               </a:buClr>
               <a:buSzPts val="1100"/>
-              <a:buFont typeface="Arial"/>
               <a:buNone/>
             </a:pPr>
             <a:r>
-              <a:rPr lang="en" dirty="0" smtClean="0">
+              <a:rPr lang="en-US" dirty="0" err="1" smtClean="0">
                 <a:latin typeface="Calibri"/>
                 <a:ea typeface="Calibri"/>
                 <a:cs typeface="Calibri"/>
                 <a:sym typeface="Calibri"/>
               </a:rPr>
-              <a:t>More output C, lower ripple</a:t>
+              <a:t>Ćuk</a:t>
             </a:r>
-          </a:p>
-          <a:p>
-            <a:pPr lvl="0">
-              <a:spcBef>
-                <a:spcPts val="0"/>
-              </a:spcBef>
-              <a:buClr>
-                <a:schemeClr val="dk1"/>
-              </a:buClr>
-              <a:buSzPts val="1100"/>
-              <a:buFont typeface="Arial"/>
-              <a:buNone/>
-            </a:pPr>
             <a:r>
-              <a:rPr lang="en" dirty="0" smtClean="0">
+              <a:rPr lang="en-US" dirty="0" smtClean="0">
                 <a:latin typeface="Calibri"/>
                 <a:ea typeface="Calibri"/>
                 <a:cs typeface="Calibri"/>
                 <a:sym typeface="Calibri"/>
               </a:rPr>
-              <a:t>Faster switch, smaller bites, lower ripple</a:t>
+              <a:t> – (chook) a Buck/Boost but negative output</a:t>
             </a:r>
           </a:p>
           <a:p>
             <a:pPr lvl="0">
-              <a:spcBef>
-                <a:spcPts val="0"/>
-              </a:spcBef>
               <a:buClr>
                 <a:schemeClr val="dk1"/>
               </a:buClr>
               <a:buSzPts val="1100"/>
-              <a:buFont typeface="Arial"/>
               <a:buNone/>
             </a:pPr>
             <a:r>
-              <a:rPr lang="en" dirty="0" smtClean="0">
+              <a:rPr lang="en-US" dirty="0" err="1" smtClean="0">
                 <a:latin typeface="Calibri"/>
                 <a:ea typeface="Calibri"/>
                 <a:cs typeface="Calibri"/>
                 <a:sym typeface="Calibri"/>
               </a:rPr>
-              <a:t>High frequency can generate RF noise, or mess with clocks on your microcontroller</a:t>
+              <a:t>Flyback</a:t>
+            </a:r>
+            <a:r>
+              <a:rPr lang="en-US" dirty="0" smtClean="0">
+                <a:latin typeface="Calibri"/>
+                <a:ea typeface="Calibri"/>
+                <a:cs typeface="Calibri"/>
+                <a:sym typeface="Calibri"/>
+              </a:rPr>
+              <a:t> – Isolation of input/output via transformer</a:t>
+            </a:r>
+          </a:p>
+          <a:p>
+            <a:pPr lvl="0">
+              <a:buClr>
+                <a:schemeClr val="dk1"/>
+              </a:buClr>
+              <a:buSzPts val="1100"/>
+              <a:buNone/>
+            </a:pPr>
+            <a:endParaRPr lang="en-US" dirty="0">
+              <a:latin typeface="Calibri"/>
+              <a:ea typeface="Calibri"/>
+              <a:cs typeface="Calibri"/>
+              <a:sym typeface="Calibri"/>
+            </a:endParaRPr>
+          </a:p>
+          <a:p>
+            <a:pPr lvl="0">
+              <a:buClr>
+                <a:schemeClr val="dk1"/>
+              </a:buClr>
+              <a:buSzPts val="1100"/>
+              <a:buNone/>
+            </a:pPr>
+            <a:r>
+              <a:rPr lang="en-US" dirty="0" smtClean="0">
+                <a:latin typeface="Calibri"/>
+                <a:ea typeface="Calibri"/>
+                <a:cs typeface="Calibri"/>
+                <a:sym typeface="Calibri"/>
+              </a:rPr>
+              <a:t>Many, many variations…</a:t>
             </a:r>
             <a:endParaRPr lang="en" dirty="0">
               <a:latin typeface="Calibri"/>
@@ -9683,40 +9684,10 @@
           </a:p>
         </p:txBody>
       </p:sp>
-      <p:pic>
-        <p:nvPicPr>
-          <p:cNvPr id="2" name="Picture 1"/>
-          <p:cNvPicPr>
-            <a:picLocks noChangeAspect="1"/>
-          </p:cNvPicPr>
-          <p:nvPr/>
-        </p:nvPicPr>
-        <p:blipFill>
-          <a:blip r:embed="rId5">
-            <a:extLst>
-              <a:ext uri="{28A0092B-C50C-407E-A947-70E740481C1C}">
-                <a14:useLocalDpi xmlns:a14="http://schemas.microsoft.com/office/drawing/2010/main" val="0"/>
-              </a:ext>
-            </a:extLst>
-          </a:blip>
-          <a:stretch>
-            <a:fillRect/>
-          </a:stretch>
-        </p:blipFill>
-        <p:spPr>
-          <a:xfrm>
-            <a:off x="3382471" y="1327150"/>
-            <a:ext cx="5578855" cy="1928639"/>
-          </a:xfrm>
-          <a:prstGeom prst="rect">
-            <a:avLst/>
-          </a:prstGeom>
-        </p:spPr>
-      </p:pic>
     </p:spTree>
     <p:extLst>
       <p:ext uri="{BB962C8B-B14F-4D97-AF65-F5344CB8AC3E}">
-        <p14:creationId xmlns:p14="http://schemas.microsoft.com/office/powerpoint/2010/main" val="346002874"/>
+        <p14:creationId xmlns:p14="http://schemas.microsoft.com/office/powerpoint/2010/main" val="3205349303"/>
       </p:ext>
     </p:extLst>
   </p:cSld>
@@ -9830,7 +9801,7 @@
                 <a:cs typeface="Calibri"/>
                 <a:sym typeface="Calibri"/>
               </a:rPr>
-              <a:t>Control</a:t>
+              <a:t>Output Ripple</a:t>
             </a:r>
             <a:endParaRPr lang="en" dirty="0">
               <a:latin typeface="Calibri"/>
@@ -9853,8 +9824,8 @@
         </p:nvSpPr>
         <p:spPr>
           <a:xfrm>
-            <a:off x="80919" y="1361764"/>
-            <a:ext cx="4078387" cy="1894026"/>
+            <a:off x="80920" y="1060057"/>
+            <a:ext cx="3681876" cy="3034513"/>
           </a:xfrm>
           <a:prstGeom prst="rect">
             <a:avLst/>
@@ -9884,21 +9855,8 @@
                 <a:cs typeface="Calibri"/>
                 <a:sym typeface="Calibri"/>
               </a:rPr>
-              <a:t>Switch is actually a transistor (surprise!)</a:t>
+              <a:t>Ripple in </a:t>
             </a:r>
-          </a:p>
-          <a:p>
-            <a:pPr lvl="0">
-              <a:spcBef>
-                <a:spcPts val="0"/>
-              </a:spcBef>
-              <a:buClr>
-                <a:schemeClr val="dk1"/>
-              </a:buClr>
-              <a:buSzPts val="1100"/>
-              <a:buFont typeface="Arial"/>
-              <a:buNone/>
-            </a:pPr>
             <a:r>
               <a:rPr lang="en" dirty="0" smtClean="0">
                 <a:latin typeface="Calibri"/>
@@ -9906,8 +9864,14 @@
                 <a:cs typeface="Calibri"/>
                 <a:sym typeface="Calibri"/>
               </a:rPr>
-              <a:t>Controller can be ‘open loop’ or ‘closed loop’</a:t>
+              <a:t>output is gonna happen</a:t>
             </a:r>
+            <a:endParaRPr lang="en" dirty="0" smtClean="0">
+              <a:latin typeface="Calibri"/>
+              <a:ea typeface="Calibri"/>
+              <a:cs typeface="Calibri"/>
+              <a:sym typeface="Calibri"/>
+            </a:endParaRPr>
           </a:p>
           <a:p>
             <a:pPr lvl="0">
@@ -9928,7 +9892,51 @@
                 <a:cs typeface="Calibri"/>
                 <a:sym typeface="Calibri"/>
               </a:rPr>
-              <a:t>Open loop is not common</a:t>
+              <a:t>More output C, lower ripple</a:t>
+            </a:r>
+          </a:p>
+          <a:p>
+            <a:pPr lvl="0">
+              <a:spcBef>
+                <a:spcPts val="0"/>
+              </a:spcBef>
+              <a:buClr>
+                <a:schemeClr val="dk1"/>
+              </a:buClr>
+              <a:buSzPts val="1100"/>
+              <a:buFont typeface="Arial"/>
+              <a:buNone/>
+            </a:pPr>
+            <a:r>
+              <a:rPr lang="en" dirty="0" smtClean="0">
+                <a:latin typeface="Calibri"/>
+                <a:ea typeface="Calibri"/>
+                <a:cs typeface="Calibri"/>
+                <a:sym typeface="Calibri"/>
+              </a:rPr>
+              <a:t>Faster switch, smaller bites, lower ripple</a:t>
+            </a:r>
+          </a:p>
+          <a:p>
+            <a:pPr lvl="0">
+              <a:spcBef>
+                <a:spcPts val="0"/>
+              </a:spcBef>
+              <a:buClr>
+                <a:schemeClr val="dk1"/>
+              </a:buClr>
+              <a:buSzPts val="1100"/>
+              <a:buFont typeface="Arial"/>
+              <a:buNone/>
+            </a:pPr>
+            <a:r>
+              <a:rPr lang="en" dirty="0" smtClean="0">
+                <a:latin typeface="Calibri"/>
+                <a:ea typeface="Calibri"/>
+                <a:cs typeface="Calibri"/>
+                <a:sym typeface="Calibri"/>
+              </a:rPr>
+              <a:t>High frequency can generate RF noise, or mess with clocks on your microcontroller</a:t>
             </a:r>
             <a:endParaRPr lang="en" dirty="0">
               <a:latin typeface="Calibri"/>
@@ -10046,7 +10054,7 @@
       </p:sp>
       <p:pic>
         <p:nvPicPr>
-          <p:cNvPr id="3" name="Picture 2"/>
+          <p:cNvPr id="2" name="Picture 1"/>
           <p:cNvPicPr>
             <a:picLocks noChangeAspect="1"/>
           </p:cNvPicPr>
@@ -10066,8 +10074,8 @@
         </p:blipFill>
         <p:spPr>
           <a:xfrm>
-            <a:off x="4459087" y="1067732"/>
-            <a:ext cx="4267200" cy="2190750"/>
+            <a:off x="3382471" y="1327150"/>
+            <a:ext cx="5578855" cy="1928639"/>
           </a:xfrm>
           <a:prstGeom prst="rect">
             <a:avLst/>
@@ -10077,7 +10085,7 @@
     </p:spTree>
     <p:extLst>
       <p:ext uri="{BB962C8B-B14F-4D97-AF65-F5344CB8AC3E}">
-        <p14:creationId xmlns:p14="http://schemas.microsoft.com/office/powerpoint/2010/main" val="4250121157"/>
+        <p14:creationId xmlns:p14="http://schemas.microsoft.com/office/powerpoint/2010/main" val="346002874"/>
       </p:ext>
     </p:extLst>
   </p:cSld>
@@ -10214,8 +10222,8 @@
         </p:nvSpPr>
         <p:spPr>
           <a:xfrm>
-            <a:off x="105195" y="946274"/>
-            <a:ext cx="3827533" cy="2498137"/>
+            <a:off x="80919" y="1361764"/>
+            <a:ext cx="4078387" cy="1894026"/>
           </a:xfrm>
           <a:prstGeom prst="rect">
             <a:avLst/>
@@ -10245,7 +10253,7 @@
                 <a:cs typeface="Calibri"/>
                 <a:sym typeface="Calibri"/>
               </a:rPr>
-              <a:t>Controller can be a dedicated chip</a:t>
+              <a:t>Switch is actually a transistor (surprise!)</a:t>
             </a:r>
           </a:p>
           <a:p>
@@ -10267,7 +10275,7 @@
                 <a:cs typeface="Calibri"/>
                 <a:sym typeface="Calibri"/>
               </a:rPr>
-              <a:t>Or a 555 timer with a feedback element</a:t>
+              <a:t>Controller can be ‘open loop’ or ‘closed loop’</a:t>
             </a:r>
           </a:p>
           <a:p>
@@ -10289,7 +10297,7 @@
                 <a:cs typeface="Calibri"/>
                 <a:sym typeface="Calibri"/>
               </a:rPr>
-              <a:t>Or a microcontroller</a:t>
+              <a:t>Open loop is not common</a:t>
             </a:r>
             <a:endParaRPr lang="en" dirty="0">
               <a:latin typeface="Calibri"/>
@@ -10297,28 +10305,6 @@
               <a:cs typeface="Calibri"/>
               <a:sym typeface="Calibri"/>
             </a:endParaRPr>
-          </a:p>
-          <a:p>
-            <a:pPr lvl="0">
-              <a:spcBef>
-                <a:spcPts val="0"/>
-              </a:spcBef>
-              <a:buClr>
-                <a:schemeClr val="dk1"/>
-              </a:buClr>
-              <a:buSzPts val="1100"/>
-              <a:buFont typeface="Arial"/>
-              <a:buNone/>
-            </a:pPr>
-            <a:r>
-              <a:rPr lang="en" dirty="0" smtClean="0">
-                <a:latin typeface="Calibri"/>
-                <a:ea typeface="Calibri"/>
-                <a:cs typeface="Calibri"/>
-                <a:sym typeface="Calibri"/>
-              </a:rPr>
-              <a:t>Or a monkey with a push button</a:t>
-            </a:r>
           </a:p>
         </p:txBody>
       </p:sp>
@@ -10429,7 +10415,7 @@
       </p:sp>
       <p:pic>
         <p:nvPicPr>
-          <p:cNvPr id="2" name="Picture 1"/>
+          <p:cNvPr id="3" name="Picture 2"/>
           <p:cNvPicPr>
             <a:picLocks noChangeAspect="1"/>
           </p:cNvPicPr>
@@ -10449,8 +10435,8 @@
         </p:blipFill>
         <p:spPr>
           <a:xfrm>
-            <a:off x="4143238" y="404475"/>
-            <a:ext cx="4913545" cy="3581737"/>
+            <a:off x="4459087" y="1067732"/>
+            <a:ext cx="4267200" cy="2190750"/>
           </a:xfrm>
           <a:prstGeom prst="rect">
             <a:avLst/>
@@ -10460,7 +10446,7 @@
     </p:spTree>
     <p:extLst>
       <p:ext uri="{BB962C8B-B14F-4D97-AF65-F5344CB8AC3E}">
-        <p14:creationId xmlns:p14="http://schemas.microsoft.com/office/powerpoint/2010/main" val="391159642"/>
+        <p14:creationId xmlns:p14="http://schemas.microsoft.com/office/powerpoint/2010/main" val="4250121157"/>
       </p:ext>
     </p:extLst>
   </p:cSld>
@@ -10878,9 +10864,166 @@
                 <a:cs typeface="Calibri"/>
                 <a:sym typeface="Calibri"/>
               </a:rPr>
-              <a:t>Efficiency</a:t>
+              <a:t>Control</a:t>
             </a:r>
             <a:endParaRPr lang="en" dirty="0">
+              <a:latin typeface="Calibri"/>
+              <a:ea typeface="Calibri"/>
+              <a:cs typeface="Calibri"/>
+              <a:sym typeface="Calibri"/>
+            </a:endParaRPr>
+          </a:p>
+        </p:txBody>
+      </p:sp>
+      <p:sp>
+        <p:nvSpPr>
+          <p:cNvPr id="63" name="Shape 63"/>
+          <p:cNvSpPr txBox="1">
+            <a:spLocks noGrp="1"/>
+          </p:cNvSpPr>
+          <p:nvPr>
+            <p:ph type="body" idx="1"/>
+          </p:nvPr>
+        </p:nvSpPr>
+        <p:spPr>
+          <a:xfrm>
+            <a:off x="105195" y="946274"/>
+            <a:ext cx="3827533" cy="2848891"/>
+          </a:xfrm>
+          <a:prstGeom prst="rect">
+            <a:avLst/>
+          </a:prstGeom>
+        </p:spPr>
+        <p:txBody>
+          <a:bodyPr wrap="square" lIns="91425" tIns="91425" rIns="91425" bIns="91425" anchor="t" anchorCtr="0">
+            <a:noAutofit/>
+          </a:bodyPr>
+          <a:lstStyle/>
+          <a:p>
+            <a:pPr lvl="0">
+              <a:spcBef>
+                <a:spcPts val="0"/>
+              </a:spcBef>
+              <a:buClr>
+                <a:schemeClr val="dk1"/>
+              </a:buClr>
+              <a:buSzPts val="1100"/>
+              <a:buFont typeface="Arial"/>
+              <a:buNone/>
+            </a:pPr>
+            <a:r>
+              <a:rPr lang="en" dirty="0" smtClean="0">
+                <a:latin typeface="Calibri"/>
+                <a:ea typeface="Calibri"/>
+                <a:cs typeface="Calibri"/>
+                <a:sym typeface="Calibri"/>
+              </a:rPr>
+              <a:t>Controller can be a dedicated chip</a:t>
+            </a:r>
+          </a:p>
+          <a:p>
+            <a:pPr lvl="0">
+              <a:spcBef>
+                <a:spcPts val="0"/>
+              </a:spcBef>
+              <a:buClr>
+                <a:schemeClr val="dk1"/>
+              </a:buClr>
+              <a:buSzPts val="1100"/>
+              <a:buFont typeface="Arial"/>
+              <a:buNone/>
+            </a:pPr>
+            <a:r>
+              <a:rPr lang="en" dirty="0" smtClean="0">
+                <a:latin typeface="Calibri"/>
+                <a:ea typeface="Calibri"/>
+                <a:cs typeface="Calibri"/>
+                <a:sym typeface="Calibri"/>
+              </a:rPr>
+              <a:t>Or a 555 timer with a feedback element</a:t>
+            </a:r>
+          </a:p>
+          <a:p>
+            <a:pPr lvl="0">
+              <a:spcBef>
+                <a:spcPts val="0"/>
+              </a:spcBef>
+              <a:buClr>
+                <a:schemeClr val="dk1"/>
+              </a:buClr>
+              <a:buSzPts val="1100"/>
+              <a:buFont typeface="Arial"/>
+              <a:buNone/>
+            </a:pPr>
+            <a:r>
+              <a:rPr lang="en" dirty="0" smtClean="0">
+                <a:latin typeface="Calibri"/>
+                <a:ea typeface="Calibri"/>
+                <a:cs typeface="Calibri"/>
+                <a:sym typeface="Calibri"/>
+              </a:rPr>
+              <a:t>Or a microcontroller</a:t>
+            </a:r>
+            <a:endParaRPr lang="en" dirty="0">
+              <a:latin typeface="Calibri"/>
+              <a:ea typeface="Calibri"/>
+              <a:cs typeface="Calibri"/>
+              <a:sym typeface="Calibri"/>
+            </a:endParaRPr>
+          </a:p>
+          <a:p>
+            <a:pPr lvl="0">
+              <a:spcBef>
+                <a:spcPts val="0"/>
+              </a:spcBef>
+              <a:buClr>
+                <a:schemeClr val="dk1"/>
+              </a:buClr>
+              <a:buSzPts val="1100"/>
+              <a:buFont typeface="Arial"/>
+              <a:buNone/>
+            </a:pPr>
+            <a:r>
+              <a:rPr lang="en" dirty="0" smtClean="0">
+                <a:latin typeface="Calibri"/>
+                <a:ea typeface="Calibri"/>
+                <a:cs typeface="Calibri"/>
+                <a:sym typeface="Calibri"/>
+              </a:rPr>
+              <a:t>Or a monkey with a push </a:t>
+            </a:r>
+            <a:r>
+              <a:rPr lang="en" dirty="0" smtClean="0">
+                <a:latin typeface="Calibri"/>
+                <a:ea typeface="Calibri"/>
+                <a:cs typeface="Calibri"/>
+                <a:sym typeface="Calibri"/>
+              </a:rPr>
+              <a:t>button</a:t>
+            </a:r>
+          </a:p>
+          <a:p>
+            <a:pPr lvl="0">
+              <a:spcBef>
+                <a:spcPts val="0"/>
+              </a:spcBef>
+              <a:buClr>
+                <a:schemeClr val="dk1"/>
+              </a:buClr>
+              <a:buSzPts val="1100"/>
+              <a:buFont typeface="Arial"/>
+              <a:buNone/>
+            </a:pPr>
+            <a:r>
+              <a:rPr lang="en" dirty="0" smtClean="0">
+                <a:latin typeface="Calibri"/>
+                <a:ea typeface="Calibri"/>
+                <a:cs typeface="Calibri"/>
+                <a:sym typeface="Calibri"/>
+              </a:rPr>
+              <a:t>PID, open loop, other methods</a:t>
+            </a:r>
+            <a:endParaRPr lang="en" dirty="0" smtClean="0">
               <a:latin typeface="Calibri"/>
               <a:ea typeface="Calibri"/>
               <a:cs typeface="Calibri"/>
@@ -10996,7 +11139,7 @@
       </p:sp>
       <p:pic>
         <p:nvPicPr>
-          <p:cNvPr id="3" name="Picture 2"/>
+          <p:cNvPr id="2" name="Picture 1"/>
           <p:cNvPicPr>
             <a:picLocks noChangeAspect="1"/>
           </p:cNvPicPr>
@@ -11016,8 +11159,8 @@
         </p:blipFill>
         <p:spPr>
           <a:xfrm>
-            <a:off x="1857375" y="1390735"/>
-            <a:ext cx="5429250" cy="2038350"/>
+            <a:off x="4143238" y="404475"/>
+            <a:ext cx="4913545" cy="3581737"/>
           </a:xfrm>
           <a:prstGeom prst="rect">
             <a:avLst/>
@@ -11027,7 +11170,7 @@
     </p:spTree>
     <p:extLst>
       <p:ext uri="{BB962C8B-B14F-4D97-AF65-F5344CB8AC3E}">
-        <p14:creationId xmlns:p14="http://schemas.microsoft.com/office/powerpoint/2010/main" val="1207691477"/>
+        <p14:creationId xmlns:p14="http://schemas.microsoft.com/office/powerpoint/2010/main" val="391159642"/>
       </p:ext>
     </p:extLst>
   </p:cSld>
@@ -11141,6 +11284,269 @@
                 <a:cs typeface="Calibri"/>
                 <a:sym typeface="Calibri"/>
               </a:rPr>
+              <a:t>Efficiency</a:t>
+            </a:r>
+            <a:endParaRPr lang="en" dirty="0">
+              <a:latin typeface="Calibri"/>
+              <a:ea typeface="Calibri"/>
+              <a:cs typeface="Calibri"/>
+              <a:sym typeface="Calibri"/>
+            </a:endParaRPr>
+          </a:p>
+        </p:txBody>
+      </p:sp>
+      <p:pic>
+        <p:nvPicPr>
+          <p:cNvPr id="64" name="Shape 64" descr="hamster-university-01.png"/>
+          <p:cNvPicPr preferRelativeResize="0"/>
+          <p:nvPr/>
+        </p:nvPicPr>
+        <p:blipFill>
+          <a:blip r:embed="rId3">
+            <a:alphaModFix/>
+          </a:blip>
+          <a:stretch>
+            <a:fillRect/>
+          </a:stretch>
+        </p:blipFill>
+        <p:spPr>
+          <a:xfrm>
+            <a:off x="8308575" y="4313200"/>
+            <a:ext cx="835425" cy="830300"/>
+          </a:xfrm>
+          <a:prstGeom prst="rect">
+            <a:avLst/>
+          </a:prstGeom>
+          <a:noFill/>
+          <a:ln>
+            <a:noFill/>
+          </a:ln>
+        </p:spPr>
+      </p:pic>
+      <p:pic>
+        <p:nvPicPr>
+          <p:cNvPr id="65" name="Shape 65" descr="DC801-Minibadge-Front-Basic.png"/>
+          <p:cNvPicPr preferRelativeResize="0"/>
+          <p:nvPr/>
+        </p:nvPicPr>
+        <p:blipFill>
+          <a:blip r:embed="rId4">
+            <a:alphaModFix/>
+          </a:blip>
+          <a:stretch>
+            <a:fillRect/>
+          </a:stretch>
+        </p:blipFill>
+        <p:spPr>
+          <a:xfrm>
+            <a:off x="0" y="4345550"/>
+            <a:ext cx="789065" cy="765576"/>
+          </a:xfrm>
+          <a:prstGeom prst="rect">
+            <a:avLst/>
+          </a:prstGeom>
+          <a:noFill/>
+          <a:ln>
+            <a:noFill/>
+          </a:ln>
+        </p:spPr>
+      </p:pic>
+      <p:sp>
+        <p:nvSpPr>
+          <p:cNvPr id="66" name="Shape 66"/>
+          <p:cNvSpPr txBox="1"/>
+          <p:nvPr/>
+        </p:nvSpPr>
+        <p:spPr>
+          <a:xfrm>
+            <a:off x="6944025" y="4735825"/>
+            <a:ext cx="1560600" cy="320400"/>
+          </a:xfrm>
+          <a:prstGeom prst="rect">
+            <a:avLst/>
+          </a:prstGeom>
+          <a:noFill/>
+          <a:ln>
+            <a:noFill/>
+          </a:ln>
+        </p:spPr>
+        <p:txBody>
+          <a:bodyPr wrap="square" lIns="91425" tIns="91425" rIns="91425" bIns="91425" anchor="t" anchorCtr="0">
+            <a:noAutofit/>
+          </a:bodyPr>
+          <a:lstStyle/>
+          <a:p>
+            <a:pPr lvl="0" rtl="0">
+              <a:spcBef>
+                <a:spcPts val="0"/>
+              </a:spcBef>
+              <a:buNone/>
+            </a:pPr>
+            <a:r>
+              <a:rPr lang="en" sz="1800" dirty="0" smtClean="0">
+                <a:latin typeface="Calibri"/>
+                <a:ea typeface="Calibri"/>
+                <a:cs typeface="Calibri"/>
+                <a:sym typeface="Calibri"/>
+              </a:rPr>
+              <a:t>SMPS 101</a:t>
+            </a:r>
+            <a:endParaRPr lang="en" sz="1800" dirty="0">
+              <a:latin typeface="Calibri"/>
+              <a:ea typeface="Calibri"/>
+              <a:cs typeface="Calibri"/>
+              <a:sym typeface="Calibri"/>
+            </a:endParaRPr>
+          </a:p>
+        </p:txBody>
+      </p:sp>
+      <p:pic>
+        <p:nvPicPr>
+          <p:cNvPr id="3" name="Picture 2"/>
+          <p:cNvPicPr>
+            <a:picLocks noChangeAspect="1"/>
+          </p:cNvPicPr>
+          <p:nvPr/>
+        </p:nvPicPr>
+        <p:blipFill>
+          <a:blip r:embed="rId5">
+            <a:extLst>
+              <a:ext uri="{28A0092B-C50C-407E-A947-70E740481C1C}">
+                <a14:useLocalDpi xmlns:a14="http://schemas.microsoft.com/office/drawing/2010/main" val="0"/>
+              </a:ext>
+            </a:extLst>
+          </a:blip>
+          <a:stretch>
+            <a:fillRect/>
+          </a:stretch>
+        </p:blipFill>
+        <p:spPr>
+          <a:xfrm>
+            <a:off x="1857375" y="1390735"/>
+            <a:ext cx="5429250" cy="2038350"/>
+          </a:xfrm>
+          <a:prstGeom prst="rect">
+            <a:avLst/>
+          </a:prstGeom>
+        </p:spPr>
+      </p:pic>
+    </p:spTree>
+    <p:extLst>
+      <p:ext uri="{BB962C8B-B14F-4D97-AF65-F5344CB8AC3E}">
+        <p14:creationId xmlns:p14="http://schemas.microsoft.com/office/powerpoint/2010/main" val="1207691477"/>
+      </p:ext>
+    </p:extLst>
+  </p:cSld>
+  <p:clrMapOvr>
+    <a:masterClrMapping/>
+  </p:clrMapOvr>
+  <p:timing>
+    <p:tnLst>
+      <p:par>
+        <p:cTn id="1" dur="indefinite" restart="never" nodeType="tmRoot"/>
+      </p:par>
+    </p:tnLst>
+  </p:timing>
+</p:sld>
+</file>
+
+<file path=ppt/slides/slide22.xml><?xml version="1.0" encoding="utf-8"?>
+<p:sld xmlns:a="http://schemas.openxmlformats.org/drawingml/2006/main" xmlns:r="http://schemas.openxmlformats.org/officeDocument/2006/relationships" xmlns:p="http://schemas.openxmlformats.org/presentationml/2006/main">
+  <p:cSld>
+    <p:spTree>
+      <p:nvGrpSpPr>
+        <p:cNvPr id="1" name="Shape 60"/>
+        <p:cNvGrpSpPr/>
+        <p:nvPr/>
+      </p:nvGrpSpPr>
+      <p:grpSpPr>
+        <a:xfrm>
+          <a:off x="0" y="0"/>
+          <a:ext cx="0" cy="0"/>
+          <a:chOff x="0" y="0"/>
+          <a:chExt cx="0" cy="0"/>
+        </a:xfrm>
+      </p:grpSpPr>
+      <p:sp>
+        <p:nvSpPr>
+          <p:cNvPr id="61" name="Shape 61"/>
+          <p:cNvSpPr txBox="1"/>
+          <p:nvPr/>
+        </p:nvSpPr>
+        <p:spPr>
+          <a:xfrm>
+            <a:off x="0" y="4313150"/>
+            <a:ext cx="9144000" cy="830400"/>
+          </a:xfrm>
+          <a:prstGeom prst="rect">
+            <a:avLst/>
+          </a:prstGeom>
+          <a:solidFill>
+            <a:srgbClr val="999999"/>
+          </a:solidFill>
+          <a:ln>
+            <a:noFill/>
+          </a:ln>
+        </p:spPr>
+        <p:txBody>
+          <a:bodyPr wrap="square" lIns="91425" tIns="91425" rIns="91425" bIns="91425" anchor="t" anchorCtr="0">
+            <a:noAutofit/>
+          </a:bodyPr>
+          <a:lstStyle/>
+          <a:p>
+            <a:pPr lvl="0" rtl="0">
+              <a:spcBef>
+                <a:spcPts val="0"/>
+              </a:spcBef>
+              <a:buNone/>
+            </a:pPr>
+            <a:endParaRPr/>
+          </a:p>
+        </p:txBody>
+      </p:sp>
+      <p:sp>
+        <p:nvSpPr>
+          <p:cNvPr id="62" name="Shape 62"/>
+          <p:cNvSpPr txBox="1">
+            <a:spLocks noGrp="1"/>
+          </p:cNvSpPr>
+          <p:nvPr>
+            <p:ph type="title"/>
+          </p:nvPr>
+        </p:nvSpPr>
+        <p:spPr>
+          <a:xfrm>
+            <a:off x="311700" y="131475"/>
+            <a:ext cx="8520600" cy="546000"/>
+          </a:xfrm>
+          <a:prstGeom prst="rect">
+            <a:avLst/>
+          </a:prstGeom>
+        </p:spPr>
+        <p:txBody>
+          <a:bodyPr wrap="square" lIns="91425" tIns="91425" rIns="91425" bIns="91425" anchor="t" anchorCtr="0">
+            <a:noAutofit/>
+          </a:bodyPr>
+          <a:lstStyle/>
+          <a:p>
+            <a:pPr lvl="0" rtl="0">
+              <a:spcBef>
+                <a:spcPts val="0"/>
+              </a:spcBef>
+              <a:buClr>
+                <a:schemeClr val="dk1"/>
+              </a:buClr>
+              <a:buSzPts val="1100"/>
+              <a:buFont typeface="Arial"/>
+              <a:buNone/>
+            </a:pPr>
+            <a:r>
+              <a:rPr lang="en-US" dirty="0" smtClean="0">
+                <a:latin typeface="Calibri"/>
+                <a:ea typeface="Calibri"/>
+                <a:cs typeface="Calibri"/>
+                <a:sym typeface="Calibri"/>
+              </a:rPr>
               <a:t>Topology selection guide</a:t>
             </a:r>
             <a:endParaRPr lang="en" dirty="0">
@@ -11369,7 +11775,7 @@
 </p:sld>
 </file>
 
-<file path=ppt/slides/slide22.xml><?xml version="1.0" encoding="utf-8"?>
+<file path=ppt/slides/slide23.xml><?xml version="1.0" encoding="utf-8"?>
 <p:sld xmlns:a="http://schemas.openxmlformats.org/drawingml/2006/main" xmlns:r="http://schemas.openxmlformats.org/officeDocument/2006/relationships" xmlns:p="http://schemas.openxmlformats.org/presentationml/2006/main">
   <p:cSld>
     <p:spTree>
@@ -11672,6 +12078,66 @@
           <a:chExt cx="0" cy="0"/>
         </a:xfrm>
       </p:grpSpPr>
+      <p:pic>
+        <p:nvPicPr>
+          <p:cNvPr id="3" name="Picture 2"/>
+          <p:cNvPicPr>
+            <a:picLocks noChangeAspect="1"/>
+          </p:cNvPicPr>
+          <p:nvPr/>
+        </p:nvPicPr>
+        <p:blipFill>
+          <a:blip r:embed="rId3">
+            <a:extLst>
+              <a:ext uri="{28A0092B-C50C-407E-A947-70E740481C1C}">
+                <a14:useLocalDpi xmlns:a14="http://schemas.microsoft.com/office/drawing/2010/main" val="0"/>
+              </a:ext>
+            </a:extLst>
+          </a:blip>
+          <a:stretch>
+            <a:fillRect/>
+          </a:stretch>
+        </p:blipFill>
+        <p:spPr>
+          <a:xfrm>
+            <a:off x="102187" y="1432913"/>
+            <a:ext cx="1785010" cy="2341626"/>
+          </a:xfrm>
+          <a:prstGeom prst="rect">
+            <a:avLst/>
+          </a:prstGeom>
+        </p:spPr>
+      </p:pic>
+      <p:pic>
+        <p:nvPicPr>
+          <p:cNvPr id="7" name="Picture 6"/>
+          <p:cNvPicPr>
+            <a:picLocks noChangeAspect="1"/>
+          </p:cNvPicPr>
+          <p:nvPr/>
+        </p:nvPicPr>
+        <p:blipFill>
+          <a:blip r:embed="rId4">
+            <a:extLst>
+              <a:ext uri="{28A0092B-C50C-407E-A947-70E740481C1C}">
+                <a14:useLocalDpi xmlns:a14="http://schemas.microsoft.com/office/drawing/2010/main" val="0"/>
+              </a:ext>
+            </a:extLst>
+          </a:blip>
+          <a:stretch>
+            <a:fillRect/>
+          </a:stretch>
+        </p:blipFill>
+        <p:spPr>
+          <a:xfrm>
+            <a:off x="1644436" y="1321421"/>
+            <a:ext cx="4102475" cy="2344271"/>
+          </a:xfrm>
+          <a:prstGeom prst="rect">
+            <a:avLst/>
+          </a:prstGeom>
+        </p:spPr>
+      </p:pic>
       <p:sp>
         <p:nvSpPr>
           <p:cNvPr id="61" name="Shape 61"/>
@@ -11752,7 +12218,7 @@
                 <a:cs typeface="Calibri"/>
                 <a:sym typeface="Calibri"/>
               </a:rPr>
-              <a:t>The basic – just a battery</a:t>
+              <a:t>An aside – Ohm’s Law</a:t>
             </a:r>
             <a:endParaRPr lang="en" dirty="0">
               <a:latin typeface="Calibri"/>
@@ -11763,126 +12229,6 @@
           </a:p>
         </p:txBody>
       </p:sp>
-      <p:sp>
-        <p:nvSpPr>
-          <p:cNvPr id="63" name="Shape 63"/>
-          <p:cNvSpPr txBox="1">
-            <a:spLocks noGrp="1"/>
-          </p:cNvSpPr>
-          <p:nvPr>
-            <p:ph type="body" idx="1"/>
-          </p:nvPr>
-        </p:nvSpPr>
-        <p:spPr>
-          <a:xfrm>
-            <a:off x="311700" y="1198153"/>
-            <a:ext cx="4762006" cy="2857325"/>
-          </a:xfrm>
-          <a:prstGeom prst="rect">
-            <a:avLst/>
-          </a:prstGeom>
-        </p:spPr>
-        <p:txBody>
-          <a:bodyPr wrap="square" lIns="91425" tIns="91425" rIns="91425" bIns="91425" anchor="t" anchorCtr="0">
-            <a:noAutofit/>
-          </a:bodyPr>
-          <a:lstStyle/>
-          <a:p>
-            <a:pPr lvl="0">
-              <a:spcBef>
-                <a:spcPts val="0"/>
-              </a:spcBef>
-              <a:buClr>
-                <a:schemeClr val="dk1"/>
-              </a:buClr>
-              <a:buSzPts val="1100"/>
-              <a:buFont typeface="Arial"/>
-              <a:buNone/>
-            </a:pPr>
-            <a:r>
-              <a:rPr lang="en" dirty="0" smtClean="0">
-                <a:latin typeface="Calibri"/>
-                <a:ea typeface="Calibri"/>
-                <a:cs typeface="Calibri"/>
-                <a:sym typeface="Calibri"/>
-              </a:rPr>
-              <a:t>The most basic power supply is none at all</a:t>
-            </a:r>
-          </a:p>
-          <a:p>
-            <a:pPr lvl="0">
-              <a:spcBef>
-                <a:spcPts val="0"/>
-              </a:spcBef>
-              <a:buClr>
-                <a:schemeClr val="dk1"/>
-              </a:buClr>
-              <a:buSzPts val="1100"/>
-              <a:buFont typeface="Arial"/>
-              <a:buNone/>
-            </a:pPr>
-            <a:r>
-              <a:rPr lang="en" dirty="0" smtClean="0">
-                <a:latin typeface="Calibri"/>
-                <a:ea typeface="Calibri"/>
-                <a:cs typeface="Calibri"/>
-                <a:sym typeface="Calibri"/>
-              </a:rPr>
-              <a:t>Pick a max battery voltage and use that</a:t>
-            </a:r>
-          </a:p>
-          <a:p>
-            <a:pPr lvl="0">
-              <a:spcBef>
-                <a:spcPts val="0"/>
-              </a:spcBef>
-              <a:buClr>
-                <a:schemeClr val="dk1"/>
-              </a:buClr>
-              <a:buSzPts val="1100"/>
-              <a:buFont typeface="Arial"/>
-              <a:buNone/>
-            </a:pPr>
-            <a:r>
-              <a:rPr lang="en" dirty="0" smtClean="0">
-                <a:latin typeface="Calibri"/>
-                <a:ea typeface="Calibri"/>
-                <a:cs typeface="Calibri"/>
-                <a:sym typeface="Calibri"/>
-              </a:rPr>
-              <a:t>Pros – Simple</a:t>
-            </a:r>
-          </a:p>
-          <a:p>
-            <a:pPr lvl="0">
-              <a:spcBef>
-                <a:spcPts val="0"/>
-              </a:spcBef>
-              <a:buClr>
-                <a:schemeClr val="dk1"/>
-              </a:buClr>
-              <a:buSzPts val="1100"/>
-              <a:buFont typeface="Arial"/>
-              <a:buNone/>
-            </a:pPr>
-            <a:r>
-              <a:rPr lang="en" dirty="0" smtClean="0">
-                <a:latin typeface="Calibri"/>
-                <a:ea typeface="Calibri"/>
-                <a:cs typeface="Calibri"/>
-                <a:sym typeface="Calibri"/>
-              </a:rPr>
-              <a:t>Cons – No regulation.  What happens when the battery discharges?</a:t>
-            </a:r>
-            <a:endParaRPr lang="en" dirty="0">
-              <a:latin typeface="Calibri"/>
-              <a:ea typeface="Calibri"/>
-              <a:cs typeface="Calibri"/>
-              <a:sym typeface="Calibri"/>
-            </a:endParaRPr>
-          </a:p>
-        </p:txBody>
-      </p:sp>
       <p:pic>
         <p:nvPicPr>
           <p:cNvPr id="64" name="Shape 64" descr="hamster-university-01.png"/>
@@ -11890,7 +12236,7 @@
           <p:nvPr/>
         </p:nvPicPr>
         <p:blipFill>
-          <a:blip r:embed="rId3">
+          <a:blip r:embed="rId5">
             <a:alphaModFix/>
           </a:blip>
           <a:stretch>
@@ -11918,7 +12264,7 @@
           <p:nvPr/>
         </p:nvPicPr>
         <p:blipFill>
-          <a:blip r:embed="rId4">
+          <a:blip r:embed="rId6">
             <a:alphaModFix/>
           </a:blip>
           <a:stretch>
@@ -11990,14 +12336,14 @@
       </p:sp>
       <p:pic>
         <p:nvPicPr>
-          <p:cNvPr id="9" name="Picture 8"/>
+          <p:cNvPr id="5" name="Picture 4"/>
           <p:cNvPicPr>
             <a:picLocks noChangeAspect="1"/>
           </p:cNvPicPr>
           <p:nvPr/>
         </p:nvPicPr>
         <p:blipFill>
-          <a:blip r:embed="rId5">
+          <a:blip r:embed="rId7">
             <a:extLst>
               <a:ext uri="{28A0092B-C50C-407E-A947-70E740481C1C}">
                 <a14:useLocalDpi xmlns:a14="http://schemas.microsoft.com/office/drawing/2010/main" val="0"/>
@@ -12010,8 +12356,8 @@
         </p:blipFill>
         <p:spPr>
           <a:xfrm>
-            <a:off x="4969101" y="935147"/>
-            <a:ext cx="3949848" cy="2400147"/>
+            <a:off x="5710845" y="85776"/>
+            <a:ext cx="3121455" cy="4148250"/>
           </a:xfrm>
           <a:prstGeom prst="rect">
             <a:avLst/>
@@ -12021,7 +12367,7 @@
     </p:spTree>
     <p:extLst>
       <p:ext uri="{BB962C8B-B14F-4D97-AF65-F5344CB8AC3E}">
-        <p14:creationId xmlns:p14="http://schemas.microsoft.com/office/powerpoint/2010/main" val="2280063515"/>
+        <p14:creationId xmlns:p14="http://schemas.microsoft.com/office/powerpoint/2010/main" val="1679407647"/>
       </p:ext>
     </p:extLst>
   </p:cSld>
@@ -12135,6 +12481,389 @@
                 <a:cs typeface="Calibri"/>
                 <a:sym typeface="Calibri"/>
               </a:rPr>
+              <a:t>The basic – just a battery</a:t>
+            </a:r>
+            <a:endParaRPr lang="en" dirty="0">
+              <a:latin typeface="Calibri"/>
+              <a:ea typeface="Calibri"/>
+              <a:cs typeface="Calibri"/>
+              <a:sym typeface="Calibri"/>
+            </a:endParaRPr>
+          </a:p>
+        </p:txBody>
+      </p:sp>
+      <p:sp>
+        <p:nvSpPr>
+          <p:cNvPr id="63" name="Shape 63"/>
+          <p:cNvSpPr txBox="1">
+            <a:spLocks noGrp="1"/>
+          </p:cNvSpPr>
+          <p:nvPr>
+            <p:ph type="body" idx="1"/>
+          </p:nvPr>
+        </p:nvSpPr>
+        <p:spPr>
+          <a:xfrm>
+            <a:off x="311700" y="1198153"/>
+            <a:ext cx="4762006" cy="2857325"/>
+          </a:xfrm>
+          <a:prstGeom prst="rect">
+            <a:avLst/>
+          </a:prstGeom>
+        </p:spPr>
+        <p:txBody>
+          <a:bodyPr wrap="square" lIns="91425" tIns="91425" rIns="91425" bIns="91425" anchor="t" anchorCtr="0">
+            <a:noAutofit/>
+          </a:bodyPr>
+          <a:lstStyle/>
+          <a:p>
+            <a:pPr lvl="0">
+              <a:spcBef>
+                <a:spcPts val="0"/>
+              </a:spcBef>
+              <a:buClr>
+                <a:schemeClr val="dk1"/>
+              </a:buClr>
+              <a:buSzPts val="1100"/>
+              <a:buFont typeface="Arial"/>
+              <a:buNone/>
+            </a:pPr>
+            <a:r>
+              <a:rPr lang="en" dirty="0" smtClean="0">
+                <a:latin typeface="Calibri"/>
+                <a:ea typeface="Calibri"/>
+                <a:cs typeface="Calibri"/>
+                <a:sym typeface="Calibri"/>
+              </a:rPr>
+              <a:t>The most basic power supply is none at all</a:t>
+            </a:r>
+          </a:p>
+          <a:p>
+            <a:pPr lvl="0">
+              <a:spcBef>
+                <a:spcPts val="0"/>
+              </a:spcBef>
+              <a:buClr>
+                <a:schemeClr val="dk1"/>
+              </a:buClr>
+              <a:buSzPts val="1100"/>
+              <a:buFont typeface="Arial"/>
+              <a:buNone/>
+            </a:pPr>
+            <a:r>
+              <a:rPr lang="en" dirty="0" smtClean="0">
+                <a:latin typeface="Calibri"/>
+                <a:ea typeface="Calibri"/>
+                <a:cs typeface="Calibri"/>
+                <a:sym typeface="Calibri"/>
+              </a:rPr>
+              <a:t>Pick a max battery voltage and use that</a:t>
+            </a:r>
+          </a:p>
+          <a:p>
+            <a:pPr lvl="0">
+              <a:spcBef>
+                <a:spcPts val="0"/>
+              </a:spcBef>
+              <a:buClr>
+                <a:schemeClr val="dk1"/>
+              </a:buClr>
+              <a:buSzPts val="1100"/>
+              <a:buFont typeface="Arial"/>
+              <a:buNone/>
+            </a:pPr>
+            <a:r>
+              <a:rPr lang="en" dirty="0" smtClean="0">
+                <a:latin typeface="Calibri"/>
+                <a:ea typeface="Calibri"/>
+                <a:cs typeface="Calibri"/>
+                <a:sym typeface="Calibri"/>
+              </a:rPr>
+              <a:t>Pros – Simple</a:t>
+            </a:r>
+          </a:p>
+          <a:p>
+            <a:pPr lvl="0">
+              <a:spcBef>
+                <a:spcPts val="0"/>
+              </a:spcBef>
+              <a:buClr>
+                <a:schemeClr val="dk1"/>
+              </a:buClr>
+              <a:buSzPts val="1100"/>
+              <a:buFont typeface="Arial"/>
+              <a:buNone/>
+            </a:pPr>
+            <a:r>
+              <a:rPr lang="en" dirty="0" smtClean="0">
+                <a:latin typeface="Calibri"/>
+                <a:ea typeface="Calibri"/>
+                <a:cs typeface="Calibri"/>
+                <a:sym typeface="Calibri"/>
+              </a:rPr>
+              <a:t>Cons – No regulation.  What happens when the battery discharges?</a:t>
+            </a:r>
+            <a:endParaRPr lang="en" dirty="0">
+              <a:latin typeface="Calibri"/>
+              <a:ea typeface="Calibri"/>
+              <a:cs typeface="Calibri"/>
+              <a:sym typeface="Calibri"/>
+            </a:endParaRPr>
+          </a:p>
+        </p:txBody>
+      </p:sp>
+      <p:pic>
+        <p:nvPicPr>
+          <p:cNvPr id="64" name="Shape 64" descr="hamster-university-01.png"/>
+          <p:cNvPicPr preferRelativeResize="0"/>
+          <p:nvPr/>
+        </p:nvPicPr>
+        <p:blipFill>
+          <a:blip r:embed="rId3">
+            <a:alphaModFix/>
+          </a:blip>
+          <a:stretch>
+            <a:fillRect/>
+          </a:stretch>
+        </p:blipFill>
+        <p:spPr>
+          <a:xfrm>
+            <a:off x="8308575" y="4313200"/>
+            <a:ext cx="835425" cy="830300"/>
+          </a:xfrm>
+          <a:prstGeom prst="rect">
+            <a:avLst/>
+          </a:prstGeom>
+          <a:noFill/>
+          <a:ln>
+            <a:noFill/>
+          </a:ln>
+        </p:spPr>
+      </p:pic>
+      <p:pic>
+        <p:nvPicPr>
+          <p:cNvPr id="65" name="Shape 65" descr="DC801-Minibadge-Front-Basic.png"/>
+          <p:cNvPicPr preferRelativeResize="0"/>
+          <p:nvPr/>
+        </p:nvPicPr>
+        <p:blipFill>
+          <a:blip r:embed="rId4">
+            <a:alphaModFix/>
+          </a:blip>
+          <a:stretch>
+            <a:fillRect/>
+          </a:stretch>
+        </p:blipFill>
+        <p:spPr>
+          <a:xfrm>
+            <a:off x="0" y="4345550"/>
+            <a:ext cx="789065" cy="765576"/>
+          </a:xfrm>
+          <a:prstGeom prst="rect">
+            <a:avLst/>
+          </a:prstGeom>
+          <a:noFill/>
+          <a:ln>
+            <a:noFill/>
+          </a:ln>
+        </p:spPr>
+      </p:pic>
+      <p:sp>
+        <p:nvSpPr>
+          <p:cNvPr id="66" name="Shape 66"/>
+          <p:cNvSpPr txBox="1"/>
+          <p:nvPr/>
+        </p:nvSpPr>
+        <p:spPr>
+          <a:xfrm>
+            <a:off x="6944025" y="4735825"/>
+            <a:ext cx="1560600" cy="320400"/>
+          </a:xfrm>
+          <a:prstGeom prst="rect">
+            <a:avLst/>
+          </a:prstGeom>
+          <a:noFill/>
+          <a:ln>
+            <a:noFill/>
+          </a:ln>
+        </p:spPr>
+        <p:txBody>
+          <a:bodyPr wrap="square" lIns="91425" tIns="91425" rIns="91425" bIns="91425" anchor="t" anchorCtr="0">
+            <a:noAutofit/>
+          </a:bodyPr>
+          <a:lstStyle/>
+          <a:p>
+            <a:pPr lvl="0" rtl="0">
+              <a:spcBef>
+                <a:spcPts val="0"/>
+              </a:spcBef>
+              <a:buNone/>
+            </a:pPr>
+            <a:r>
+              <a:rPr lang="en" sz="1800" dirty="0" smtClean="0">
+                <a:latin typeface="Calibri"/>
+                <a:ea typeface="Calibri"/>
+                <a:cs typeface="Calibri"/>
+                <a:sym typeface="Calibri"/>
+              </a:rPr>
+              <a:t>SMPS 101</a:t>
+            </a:r>
+            <a:endParaRPr lang="en" sz="1800" dirty="0">
+              <a:latin typeface="Calibri"/>
+              <a:ea typeface="Calibri"/>
+              <a:cs typeface="Calibri"/>
+              <a:sym typeface="Calibri"/>
+            </a:endParaRPr>
+          </a:p>
+        </p:txBody>
+      </p:sp>
+      <p:pic>
+        <p:nvPicPr>
+          <p:cNvPr id="9" name="Picture 8"/>
+          <p:cNvPicPr>
+            <a:picLocks noChangeAspect="1"/>
+          </p:cNvPicPr>
+          <p:nvPr/>
+        </p:nvPicPr>
+        <p:blipFill>
+          <a:blip r:embed="rId5">
+            <a:extLst>
+              <a:ext uri="{28A0092B-C50C-407E-A947-70E740481C1C}">
+                <a14:useLocalDpi xmlns:a14="http://schemas.microsoft.com/office/drawing/2010/main" val="0"/>
+              </a:ext>
+            </a:extLst>
+          </a:blip>
+          <a:stretch>
+            <a:fillRect/>
+          </a:stretch>
+        </p:blipFill>
+        <p:spPr>
+          <a:xfrm>
+            <a:off x="4969101" y="935147"/>
+            <a:ext cx="3949848" cy="2400147"/>
+          </a:xfrm>
+          <a:prstGeom prst="rect">
+            <a:avLst/>
+          </a:prstGeom>
+        </p:spPr>
+      </p:pic>
+    </p:spTree>
+    <p:extLst>
+      <p:ext uri="{BB962C8B-B14F-4D97-AF65-F5344CB8AC3E}">
+        <p14:creationId xmlns:p14="http://schemas.microsoft.com/office/powerpoint/2010/main" val="2280063515"/>
+      </p:ext>
+    </p:extLst>
+  </p:cSld>
+  <p:clrMapOvr>
+    <a:masterClrMapping/>
+  </p:clrMapOvr>
+  <p:timing>
+    <p:tnLst>
+      <p:par>
+        <p:cTn id="1" dur="indefinite" restart="never" nodeType="tmRoot"/>
+      </p:par>
+    </p:tnLst>
+  </p:timing>
+</p:sld>
+</file>
+
+<file path=ppt/slides/slide5.xml><?xml version="1.0" encoding="utf-8"?>
+<p:sld xmlns:a="http://schemas.openxmlformats.org/drawingml/2006/main" xmlns:r="http://schemas.openxmlformats.org/officeDocument/2006/relationships" xmlns:p="http://schemas.openxmlformats.org/presentationml/2006/main">
+  <p:cSld>
+    <p:spTree>
+      <p:nvGrpSpPr>
+        <p:cNvPr id="1" name="Shape 60"/>
+        <p:cNvGrpSpPr/>
+        <p:nvPr/>
+      </p:nvGrpSpPr>
+      <p:grpSpPr>
+        <a:xfrm>
+          <a:off x="0" y="0"/>
+          <a:ext cx="0" cy="0"/>
+          <a:chOff x="0" y="0"/>
+          <a:chExt cx="0" cy="0"/>
+        </a:xfrm>
+      </p:grpSpPr>
+      <p:sp>
+        <p:nvSpPr>
+          <p:cNvPr id="61" name="Shape 61"/>
+          <p:cNvSpPr txBox="1"/>
+          <p:nvPr/>
+        </p:nvSpPr>
+        <p:spPr>
+          <a:xfrm>
+            <a:off x="0" y="4313150"/>
+            <a:ext cx="9144000" cy="830400"/>
+          </a:xfrm>
+          <a:prstGeom prst="rect">
+            <a:avLst/>
+          </a:prstGeom>
+          <a:solidFill>
+            <a:srgbClr val="999999"/>
+          </a:solidFill>
+          <a:ln>
+            <a:noFill/>
+          </a:ln>
+        </p:spPr>
+        <p:txBody>
+          <a:bodyPr wrap="square" lIns="91425" tIns="91425" rIns="91425" bIns="91425" anchor="t" anchorCtr="0">
+            <a:noAutofit/>
+          </a:bodyPr>
+          <a:lstStyle/>
+          <a:p>
+            <a:pPr lvl="0" rtl="0">
+              <a:spcBef>
+                <a:spcPts val="0"/>
+              </a:spcBef>
+              <a:buNone/>
+            </a:pPr>
+            <a:endParaRPr/>
+          </a:p>
+        </p:txBody>
+      </p:sp>
+      <p:sp>
+        <p:nvSpPr>
+          <p:cNvPr id="62" name="Shape 62"/>
+          <p:cNvSpPr txBox="1">
+            <a:spLocks noGrp="1"/>
+          </p:cNvSpPr>
+          <p:nvPr>
+            <p:ph type="title"/>
+          </p:nvPr>
+        </p:nvSpPr>
+        <p:spPr>
+          <a:xfrm>
+            <a:off x="311700" y="131475"/>
+            <a:ext cx="8520600" cy="546000"/>
+          </a:xfrm>
+          <a:prstGeom prst="rect">
+            <a:avLst/>
+          </a:prstGeom>
+        </p:spPr>
+        <p:txBody>
+          <a:bodyPr wrap="square" lIns="91425" tIns="91425" rIns="91425" bIns="91425" anchor="t" anchorCtr="0">
+            <a:noAutofit/>
+          </a:bodyPr>
+          <a:lstStyle/>
+          <a:p>
+            <a:pPr lvl="0" rtl="0">
+              <a:spcBef>
+                <a:spcPts val="0"/>
+              </a:spcBef>
+              <a:buClr>
+                <a:schemeClr val="dk1"/>
+              </a:buClr>
+              <a:buSzPts val="1100"/>
+              <a:buFont typeface="Arial"/>
+              <a:buNone/>
+            </a:pPr>
+            <a:r>
+              <a:rPr lang="en" dirty="0" smtClean="0">
+                <a:latin typeface="Calibri"/>
+                <a:ea typeface="Calibri"/>
+                <a:cs typeface="Calibri"/>
+                <a:sym typeface="Calibri"/>
+              </a:rPr>
               <a:t>The slightly basic – a resistor regulator</a:t>
             </a:r>
             <a:endParaRPr lang="en" dirty="0">
@@ -12233,8 +12962,23 @@
                 <a:cs typeface="Calibri"/>
                 <a:sym typeface="Calibri"/>
               </a:rPr>
-              <a:t>Pros – Simple, follows Kirchoff’s Law</a:t>
+              <a:t>Pros – Simple, </a:t>
             </a:r>
+            <a:r>
+              <a:rPr lang="en" dirty="0" smtClean="0">
+                <a:latin typeface="Calibri"/>
+                <a:ea typeface="Calibri"/>
+                <a:cs typeface="Calibri"/>
+                <a:sym typeface="Calibri"/>
+              </a:rPr>
+              <a:t>can use Kirchoff’s Law to calculate</a:t>
+            </a:r>
+            <a:endParaRPr lang="en" dirty="0" smtClean="0">
+              <a:latin typeface="Calibri"/>
+              <a:ea typeface="Calibri"/>
+              <a:cs typeface="Calibri"/>
+              <a:sym typeface="Calibri"/>
+            </a:endParaRPr>
           </a:p>
           <a:p>
             <a:pPr lvl="0">
@@ -12451,7 +13195,7 @@
 </p:sld>
 </file>
 
-<file path=ppt/slides/slide5.xml><?xml version="1.0" encoding="utf-8"?>
+<file path=ppt/slides/slide6.xml><?xml version="1.0" encoding="utf-8"?>
 <p:sld xmlns:a="http://schemas.openxmlformats.org/drawingml/2006/main" xmlns:r="http://schemas.openxmlformats.org/officeDocument/2006/relationships" xmlns:p="http://schemas.openxmlformats.org/presentationml/2006/main">
   <p:cSld>
     <p:spTree>
@@ -12578,16 +13322,7 @@
                 <a:cs typeface="Calibri"/>
                 <a:sym typeface="Calibri"/>
               </a:rPr>
-              <a:t>Regulations </a:t>
-            </a:r>
-            <a:r>
-              <a:rPr lang="en" dirty="0" smtClean="0">
-                <a:latin typeface="Calibri"/>
-                <a:ea typeface="Calibri"/>
-                <a:cs typeface="Calibri"/>
-                <a:sym typeface="Calibri"/>
-              </a:rPr>
-              <a:t>– a linear regulator</a:t>
+              <a:t>Regulations – a linear regulator</a:t>
             </a:r>
             <a:endParaRPr lang="en" dirty="0">
               <a:latin typeface="Calibri"/>
@@ -12839,315 +13574,6 @@
     <p:extLst>
       <p:ext uri="{BB962C8B-B14F-4D97-AF65-F5344CB8AC3E}">
         <p14:creationId xmlns:p14="http://schemas.microsoft.com/office/powerpoint/2010/main" val="792228401"/>
-      </p:ext>
-    </p:extLst>
-  </p:cSld>
-  <p:clrMapOvr>
-    <a:masterClrMapping/>
-  </p:clrMapOvr>
-  <p:timing>
-    <p:tnLst>
-      <p:par>
-        <p:cTn id="1" dur="indefinite" restart="never" nodeType="tmRoot"/>
-      </p:par>
-    </p:tnLst>
-  </p:timing>
-</p:sld>
-</file>
-
-<file path=ppt/slides/slide6.xml><?xml version="1.0" encoding="utf-8"?>
-<p:sld xmlns:a="http://schemas.openxmlformats.org/drawingml/2006/main" xmlns:r="http://schemas.openxmlformats.org/officeDocument/2006/relationships" xmlns:p="http://schemas.openxmlformats.org/presentationml/2006/main">
-  <p:cSld>
-    <p:spTree>
-      <p:nvGrpSpPr>
-        <p:cNvPr id="1" name="Shape 60"/>
-        <p:cNvGrpSpPr/>
-        <p:nvPr/>
-      </p:nvGrpSpPr>
-      <p:grpSpPr>
-        <a:xfrm>
-          <a:off x="0" y="0"/>
-          <a:ext cx="0" cy="0"/>
-          <a:chOff x="0" y="0"/>
-          <a:chExt cx="0" cy="0"/>
-        </a:xfrm>
-      </p:grpSpPr>
-      <p:sp>
-        <p:nvSpPr>
-          <p:cNvPr id="61" name="Shape 61"/>
-          <p:cNvSpPr txBox="1"/>
-          <p:nvPr/>
-        </p:nvSpPr>
-        <p:spPr>
-          <a:xfrm>
-            <a:off x="0" y="4313150"/>
-            <a:ext cx="9144000" cy="830400"/>
-          </a:xfrm>
-          <a:prstGeom prst="rect">
-            <a:avLst/>
-          </a:prstGeom>
-          <a:solidFill>
-            <a:srgbClr val="999999"/>
-          </a:solidFill>
-          <a:ln>
-            <a:noFill/>
-          </a:ln>
-        </p:spPr>
-        <p:txBody>
-          <a:bodyPr wrap="square" lIns="91425" tIns="91425" rIns="91425" bIns="91425" anchor="t" anchorCtr="0">
-            <a:noAutofit/>
-          </a:bodyPr>
-          <a:lstStyle/>
-          <a:p>
-            <a:pPr lvl="0" rtl="0">
-              <a:spcBef>
-                <a:spcPts val="0"/>
-              </a:spcBef>
-              <a:buNone/>
-            </a:pPr>
-            <a:endParaRPr/>
-          </a:p>
-        </p:txBody>
-      </p:sp>
-      <p:sp>
-        <p:nvSpPr>
-          <p:cNvPr id="62" name="Shape 62"/>
-          <p:cNvSpPr txBox="1">
-            <a:spLocks noGrp="1"/>
-          </p:cNvSpPr>
-          <p:nvPr>
-            <p:ph type="title"/>
-          </p:nvPr>
-        </p:nvSpPr>
-        <p:spPr>
-          <a:xfrm>
-            <a:off x="311700" y="131475"/>
-            <a:ext cx="8520600" cy="546000"/>
-          </a:xfrm>
-          <a:prstGeom prst="rect">
-            <a:avLst/>
-          </a:prstGeom>
-        </p:spPr>
-        <p:txBody>
-          <a:bodyPr wrap="square" lIns="91425" tIns="91425" rIns="91425" bIns="91425" anchor="t" anchorCtr="0">
-            <a:noAutofit/>
-          </a:bodyPr>
-          <a:lstStyle/>
-          <a:p>
-            <a:pPr lvl="0" rtl="0">
-              <a:spcBef>
-                <a:spcPts val="0"/>
-              </a:spcBef>
-              <a:buClr>
-                <a:schemeClr val="dk1"/>
-              </a:buClr>
-              <a:buSzPts val="1100"/>
-              <a:buFont typeface="Arial"/>
-              <a:buNone/>
-            </a:pPr>
-            <a:r>
-              <a:rPr lang="en" dirty="0" smtClean="0">
-                <a:latin typeface="Calibri"/>
-                <a:ea typeface="Calibri"/>
-                <a:cs typeface="Calibri"/>
-                <a:sym typeface="Calibri"/>
-              </a:rPr>
-              <a:t>The switch up</a:t>
-            </a:r>
-            <a:endParaRPr lang="en" dirty="0">
-              <a:latin typeface="Calibri"/>
-              <a:ea typeface="Calibri"/>
-              <a:cs typeface="Calibri"/>
-              <a:sym typeface="Calibri"/>
-            </a:endParaRPr>
-          </a:p>
-        </p:txBody>
-      </p:sp>
-      <p:sp>
-        <p:nvSpPr>
-          <p:cNvPr id="63" name="Shape 63"/>
-          <p:cNvSpPr txBox="1">
-            <a:spLocks noGrp="1"/>
-          </p:cNvSpPr>
-          <p:nvPr>
-            <p:ph type="body" idx="1"/>
-          </p:nvPr>
-        </p:nvSpPr>
-        <p:spPr>
-          <a:xfrm>
-            <a:off x="311699" y="1003945"/>
-            <a:ext cx="7996875" cy="2857325"/>
-          </a:xfrm>
-          <a:prstGeom prst="rect">
-            <a:avLst/>
-          </a:prstGeom>
-        </p:spPr>
-        <p:txBody>
-          <a:bodyPr wrap="square" lIns="91425" tIns="91425" rIns="91425" bIns="91425" anchor="t" anchorCtr="0">
-            <a:noAutofit/>
-          </a:bodyPr>
-          <a:lstStyle/>
-          <a:p>
-            <a:pPr lvl="0">
-              <a:spcBef>
-                <a:spcPts val="0"/>
-              </a:spcBef>
-              <a:buClr>
-                <a:schemeClr val="dk1"/>
-              </a:buClr>
-              <a:buSzPts val="1100"/>
-              <a:buFont typeface="Arial"/>
-              <a:buNone/>
-            </a:pPr>
-            <a:r>
-              <a:rPr lang="en" dirty="0" smtClean="0">
-                <a:latin typeface="Calibri"/>
-                <a:ea typeface="Calibri"/>
-                <a:cs typeface="Calibri"/>
-                <a:sym typeface="Calibri"/>
-              </a:rPr>
-              <a:t>So how do we transform voltage efficiently?  What if we want MOAR volts out than we have going in?  What if we want to go negative?</a:t>
-            </a:r>
-          </a:p>
-          <a:p>
-            <a:pPr lvl="0">
-              <a:spcBef>
-                <a:spcPts val="0"/>
-              </a:spcBef>
-              <a:buClr>
-                <a:schemeClr val="dk1"/>
-              </a:buClr>
-              <a:buSzPts val="1100"/>
-              <a:buFont typeface="Arial"/>
-              <a:buNone/>
-            </a:pPr>
-            <a:r>
-              <a:rPr lang="en" dirty="0" smtClean="0">
-                <a:latin typeface="Calibri"/>
-                <a:ea typeface="Calibri"/>
-                <a:cs typeface="Calibri"/>
-                <a:sym typeface="Calibri"/>
-              </a:rPr>
-              <a:t>Introducing the Switch Mode Power Supply!</a:t>
-            </a:r>
-            <a:endParaRPr lang="en" dirty="0">
-              <a:latin typeface="Calibri"/>
-              <a:ea typeface="Calibri"/>
-              <a:cs typeface="Calibri"/>
-              <a:sym typeface="Calibri"/>
-            </a:endParaRPr>
-          </a:p>
-        </p:txBody>
-      </p:sp>
-      <p:pic>
-        <p:nvPicPr>
-          <p:cNvPr id="64" name="Shape 64" descr="hamster-university-01.png"/>
-          <p:cNvPicPr preferRelativeResize="0"/>
-          <p:nvPr/>
-        </p:nvPicPr>
-        <p:blipFill>
-          <a:blip r:embed="rId3">
-            <a:alphaModFix/>
-          </a:blip>
-          <a:stretch>
-            <a:fillRect/>
-          </a:stretch>
-        </p:blipFill>
-        <p:spPr>
-          <a:xfrm>
-            <a:off x="8308575" y="4313200"/>
-            <a:ext cx="835425" cy="830300"/>
-          </a:xfrm>
-          <a:prstGeom prst="rect">
-            <a:avLst/>
-          </a:prstGeom>
-          <a:noFill/>
-          <a:ln>
-            <a:noFill/>
-          </a:ln>
-        </p:spPr>
-      </p:pic>
-      <p:pic>
-        <p:nvPicPr>
-          <p:cNvPr id="65" name="Shape 65" descr="DC801-Minibadge-Front-Basic.png"/>
-          <p:cNvPicPr preferRelativeResize="0"/>
-          <p:nvPr/>
-        </p:nvPicPr>
-        <p:blipFill>
-          <a:blip r:embed="rId4">
-            <a:alphaModFix/>
-          </a:blip>
-          <a:stretch>
-            <a:fillRect/>
-          </a:stretch>
-        </p:blipFill>
-        <p:spPr>
-          <a:xfrm>
-            <a:off x="0" y="4345550"/>
-            <a:ext cx="789065" cy="765576"/>
-          </a:xfrm>
-          <a:prstGeom prst="rect">
-            <a:avLst/>
-          </a:prstGeom>
-          <a:noFill/>
-          <a:ln>
-            <a:noFill/>
-          </a:ln>
-        </p:spPr>
-      </p:pic>
-      <p:sp>
-        <p:nvSpPr>
-          <p:cNvPr id="66" name="Shape 66"/>
-          <p:cNvSpPr txBox="1"/>
-          <p:nvPr/>
-        </p:nvSpPr>
-        <p:spPr>
-          <a:xfrm>
-            <a:off x="6944025" y="4735825"/>
-            <a:ext cx="1560600" cy="320400"/>
-          </a:xfrm>
-          <a:prstGeom prst="rect">
-            <a:avLst/>
-          </a:prstGeom>
-          <a:noFill/>
-          <a:ln>
-            <a:noFill/>
-          </a:ln>
-        </p:spPr>
-        <p:txBody>
-          <a:bodyPr wrap="square" lIns="91425" tIns="91425" rIns="91425" bIns="91425" anchor="t" anchorCtr="0">
-            <a:noAutofit/>
-          </a:bodyPr>
-          <a:lstStyle/>
-          <a:p>
-            <a:pPr lvl="0" rtl="0">
-              <a:spcBef>
-                <a:spcPts val="0"/>
-              </a:spcBef>
-              <a:buNone/>
-            </a:pPr>
-            <a:r>
-              <a:rPr lang="en" sz="1800" dirty="0" smtClean="0">
-                <a:latin typeface="Calibri"/>
-                <a:ea typeface="Calibri"/>
-                <a:cs typeface="Calibri"/>
-                <a:sym typeface="Calibri"/>
-              </a:rPr>
-              <a:t>SMPS 101</a:t>
-            </a:r>
-            <a:endParaRPr lang="en" sz="1800" dirty="0">
-              <a:latin typeface="Calibri"/>
-              <a:ea typeface="Calibri"/>
-              <a:cs typeface="Calibri"/>
-              <a:sym typeface="Calibri"/>
-            </a:endParaRPr>
-          </a:p>
-        </p:txBody>
-      </p:sp>
-    </p:spTree>
-    <p:extLst>
-      <p:ext uri="{BB962C8B-B14F-4D97-AF65-F5344CB8AC3E}">
-        <p14:creationId xmlns:p14="http://schemas.microsoft.com/office/powerpoint/2010/main" val="3875468397"/>
       </p:ext>
     </p:extLst>
   </p:cSld>
@@ -13261,9 +13687,155 @@
                 <a:cs typeface="Calibri"/>
                 <a:sym typeface="Calibri"/>
               </a:rPr>
-              <a:t>Topologies</a:t>
+              <a:t>The switch up</a:t>
             </a:r>
             <a:endParaRPr lang="en" dirty="0">
+              <a:latin typeface="Calibri"/>
+              <a:ea typeface="Calibri"/>
+              <a:cs typeface="Calibri"/>
+              <a:sym typeface="Calibri"/>
+            </a:endParaRPr>
+          </a:p>
+        </p:txBody>
+      </p:sp>
+      <p:sp>
+        <p:nvSpPr>
+          <p:cNvPr id="63" name="Shape 63"/>
+          <p:cNvSpPr txBox="1">
+            <a:spLocks noGrp="1"/>
+          </p:cNvSpPr>
+          <p:nvPr>
+            <p:ph type="body" idx="1"/>
+          </p:nvPr>
+        </p:nvSpPr>
+        <p:spPr>
+          <a:xfrm>
+            <a:off x="311699" y="1003945"/>
+            <a:ext cx="7996875" cy="2857325"/>
+          </a:xfrm>
+          <a:prstGeom prst="rect">
+            <a:avLst/>
+          </a:prstGeom>
+        </p:spPr>
+        <p:txBody>
+          <a:bodyPr wrap="square" lIns="91425" tIns="91425" rIns="91425" bIns="91425" anchor="t" anchorCtr="0">
+            <a:noAutofit/>
+          </a:bodyPr>
+          <a:lstStyle/>
+          <a:p>
+            <a:pPr lvl="0">
+              <a:spcBef>
+                <a:spcPts val="0"/>
+              </a:spcBef>
+              <a:buClr>
+                <a:schemeClr val="dk1"/>
+              </a:buClr>
+              <a:buSzPts val="1100"/>
+              <a:buFont typeface="Arial"/>
+              <a:buNone/>
+            </a:pPr>
+            <a:r>
+              <a:rPr lang="en" dirty="0" smtClean="0">
+                <a:latin typeface="Calibri"/>
+                <a:ea typeface="Calibri"/>
+                <a:cs typeface="Calibri"/>
+                <a:sym typeface="Calibri"/>
+              </a:rPr>
+              <a:t>So how do we transform voltage efficiently?  </a:t>
+            </a:r>
+            <a:endParaRPr lang="en" dirty="0" smtClean="0">
+              <a:latin typeface="Calibri"/>
+              <a:ea typeface="Calibri"/>
+              <a:cs typeface="Calibri"/>
+              <a:sym typeface="Calibri"/>
+            </a:endParaRPr>
+          </a:p>
+          <a:p>
+            <a:pPr lvl="0">
+              <a:spcBef>
+                <a:spcPts val="0"/>
+              </a:spcBef>
+              <a:buClr>
+                <a:schemeClr val="dk1"/>
+              </a:buClr>
+              <a:buSzPts val="1100"/>
+              <a:buFont typeface="Arial"/>
+              <a:buNone/>
+            </a:pPr>
+            <a:r>
+              <a:rPr lang="en" dirty="0" smtClean="0">
+                <a:latin typeface="Calibri"/>
+                <a:ea typeface="Calibri"/>
+                <a:cs typeface="Calibri"/>
+                <a:sym typeface="Calibri"/>
+              </a:rPr>
+              <a:t>What </a:t>
+            </a:r>
+            <a:r>
+              <a:rPr lang="en" dirty="0" smtClean="0">
+                <a:latin typeface="Calibri"/>
+                <a:ea typeface="Calibri"/>
+                <a:cs typeface="Calibri"/>
+                <a:sym typeface="Calibri"/>
+              </a:rPr>
+              <a:t>if we want MOAR volts out than we have going in?  </a:t>
+            </a:r>
+            <a:endParaRPr lang="en" dirty="0" smtClean="0">
+              <a:latin typeface="Calibri"/>
+              <a:ea typeface="Calibri"/>
+              <a:cs typeface="Calibri"/>
+              <a:sym typeface="Calibri"/>
+            </a:endParaRPr>
+          </a:p>
+          <a:p>
+            <a:pPr lvl="0">
+              <a:spcBef>
+                <a:spcPts val="0"/>
+              </a:spcBef>
+              <a:buClr>
+                <a:schemeClr val="dk1"/>
+              </a:buClr>
+              <a:buSzPts val="1100"/>
+              <a:buFont typeface="Arial"/>
+              <a:buNone/>
+            </a:pPr>
+            <a:r>
+              <a:rPr lang="en" dirty="0" smtClean="0">
+                <a:latin typeface="Calibri"/>
+                <a:ea typeface="Calibri"/>
+                <a:cs typeface="Calibri"/>
+                <a:sym typeface="Calibri"/>
+              </a:rPr>
+              <a:t>What </a:t>
+            </a:r>
+            <a:r>
+              <a:rPr lang="en" dirty="0" smtClean="0">
+                <a:latin typeface="Calibri"/>
+                <a:ea typeface="Calibri"/>
+                <a:cs typeface="Calibri"/>
+                <a:sym typeface="Calibri"/>
+              </a:rPr>
+              <a:t>if we want to go </a:t>
+            </a:r>
+            <a:r>
+              <a:rPr lang="en" dirty="0" smtClean="0">
+                <a:latin typeface="Calibri"/>
+                <a:ea typeface="Calibri"/>
+                <a:cs typeface="Calibri"/>
+                <a:sym typeface="Calibri"/>
+              </a:rPr>
+              <a:t>negative</a:t>
+            </a:r>
+            <a:r>
+              <a:rPr lang="en" dirty="0">
+                <a:latin typeface="Calibri"/>
+                <a:ea typeface="Calibri"/>
+                <a:cs typeface="Calibri"/>
+                <a:sym typeface="Calibri"/>
+              </a:rPr>
+              <a:t>?</a:t>
+            </a:r>
+            <a:endParaRPr lang="en" dirty="0" smtClean="0">
               <a:latin typeface="Calibri"/>
               <a:ea typeface="Calibri"/>
               <a:cs typeface="Calibri"/>
@@ -13377,40 +13949,10 @@
           </a:p>
         </p:txBody>
       </p:sp>
-      <p:pic>
-        <p:nvPicPr>
-          <p:cNvPr id="5" name="Picture 4"/>
-          <p:cNvPicPr>
-            <a:picLocks noChangeAspect="1"/>
-          </p:cNvPicPr>
-          <p:nvPr/>
-        </p:nvPicPr>
-        <p:blipFill>
-          <a:blip r:embed="rId5">
-            <a:extLst>
-              <a:ext uri="{28A0092B-C50C-407E-A947-70E740481C1C}">
-                <a14:useLocalDpi xmlns:a14="http://schemas.microsoft.com/office/drawing/2010/main" val="0"/>
-              </a:ext>
-            </a:extLst>
-          </a:blip>
-          <a:stretch>
-            <a:fillRect/>
-          </a:stretch>
-        </p:blipFill>
-        <p:spPr>
-          <a:xfrm>
-            <a:off x="2337500" y="34083"/>
-            <a:ext cx="4422640" cy="4922459"/>
-          </a:xfrm>
-          <a:prstGeom prst="rect">
-            <a:avLst/>
-          </a:prstGeom>
-        </p:spPr>
-      </p:pic>
     </p:spTree>
     <p:extLst>
       <p:ext uri="{BB962C8B-B14F-4D97-AF65-F5344CB8AC3E}">
-        <p14:creationId xmlns:p14="http://schemas.microsoft.com/office/powerpoint/2010/main" val="1814069948"/>
+        <p14:creationId xmlns:p14="http://schemas.microsoft.com/office/powerpoint/2010/main" val="3875468397"/>
       </p:ext>
     </p:extLst>
   </p:cSld>
@@ -13524,7 +14066,7 @@
                 <a:cs typeface="Calibri"/>
                 <a:sym typeface="Calibri"/>
               </a:rPr>
-              <a:t>Topologies</a:t>
+              <a:t>An aside – Pulse Width Modulation</a:t>
             </a:r>
             <a:endParaRPr lang="en" dirty="0">
               <a:latin typeface="Calibri"/>
@@ -13547,8 +14089,8 @@
         </p:nvSpPr>
         <p:spPr>
           <a:xfrm>
-            <a:off x="7098972" y="3584455"/>
-            <a:ext cx="1209603" cy="517358"/>
+            <a:off x="311700" y="1262329"/>
+            <a:ext cx="3726226" cy="2492347"/>
           </a:xfrm>
           <a:prstGeom prst="rect">
             <a:avLst/>
@@ -13578,8 +14120,83 @@
                 <a:cs typeface="Calibri"/>
                 <a:sym typeface="Calibri"/>
               </a:rPr>
-              <a:t>… what?</a:t>
+              <a:t>PWM is toggling a switch on and off at varying duty cycle</a:t>
             </a:r>
+          </a:p>
+          <a:p>
+            <a:pPr lvl="0">
+              <a:spcBef>
+                <a:spcPts val="0"/>
+              </a:spcBef>
+              <a:buClr>
+                <a:schemeClr val="dk1"/>
+              </a:buClr>
+              <a:buSzPts val="1100"/>
+              <a:buFont typeface="Arial"/>
+              <a:buNone/>
+            </a:pPr>
+            <a:r>
+              <a:rPr lang="en" dirty="0" smtClean="0">
+                <a:latin typeface="Calibri"/>
+                <a:ea typeface="Calibri"/>
+                <a:cs typeface="Calibri"/>
+                <a:sym typeface="Calibri"/>
+              </a:rPr>
+              <a:t>Duty cycle is expressed in percent on time</a:t>
+            </a:r>
+          </a:p>
+          <a:p>
+            <a:pPr lvl="0">
+              <a:spcBef>
+                <a:spcPts val="0"/>
+              </a:spcBef>
+              <a:buClr>
+                <a:schemeClr val="dk1"/>
+              </a:buClr>
+              <a:buSzPts val="1100"/>
+              <a:buFont typeface="Arial"/>
+              <a:buNone/>
+            </a:pPr>
+            <a:r>
+              <a:rPr lang="en" dirty="0" smtClean="0">
+                <a:latin typeface="Calibri"/>
+                <a:ea typeface="Calibri"/>
+                <a:cs typeface="Calibri"/>
+                <a:sym typeface="Calibri"/>
+              </a:rPr>
+              <a:t>Indepe</a:t>
+            </a:r>
+            <a:r>
+              <a:rPr lang="en-US" dirty="0" smtClean="0">
+                <a:latin typeface="Calibri"/>
+                <a:ea typeface="Calibri"/>
+                <a:cs typeface="Calibri"/>
+                <a:sym typeface="Calibri"/>
+              </a:rPr>
+              <a:t>n</a:t>
+            </a:r>
+            <a:r>
+              <a:rPr lang="en" dirty="0" smtClean="0">
+                <a:latin typeface="Calibri"/>
+                <a:ea typeface="Calibri"/>
+                <a:cs typeface="Calibri"/>
+                <a:sym typeface="Calibri"/>
+              </a:rPr>
+              <a:t>dent of base frequency!</a:t>
+            </a:r>
+          </a:p>
+          <a:p>
+            <a:pPr lvl="0">
+              <a:spcBef>
+                <a:spcPts val="0"/>
+              </a:spcBef>
+              <a:buClr>
+                <a:schemeClr val="dk1"/>
+              </a:buClr>
+              <a:buSzPts val="1100"/>
+              <a:buFont typeface="Arial"/>
+              <a:buNone/>
+            </a:pPr>
             <a:endParaRPr lang="en" dirty="0">
               <a:latin typeface="Calibri"/>
               <a:ea typeface="Calibri"/>
@@ -13696,7 +14313,7 @@
       </p:sp>
       <p:pic>
         <p:nvPicPr>
-          <p:cNvPr id="9" name="Picture 8"/>
+          <p:cNvPr id="3" name="Picture 2"/>
           <p:cNvPicPr>
             <a:picLocks noChangeAspect="1"/>
           </p:cNvPicPr>
@@ -13716,8 +14333,8 @@
         </p:blipFill>
         <p:spPr>
           <a:xfrm>
-            <a:off x="2337500" y="34083"/>
-            <a:ext cx="4422640" cy="4922459"/>
+            <a:off x="4255748" y="791181"/>
+            <a:ext cx="4576552" cy="3434644"/>
           </a:xfrm>
           <a:prstGeom prst="rect">
             <a:avLst/>
@@ -13727,7 +14344,7 @@
     </p:spTree>
     <p:extLst>
       <p:ext uri="{BB962C8B-B14F-4D97-AF65-F5344CB8AC3E}">
-        <p14:creationId xmlns:p14="http://schemas.microsoft.com/office/powerpoint/2010/main" val="2858399476"/>
+        <p14:creationId xmlns:p14="http://schemas.microsoft.com/office/powerpoint/2010/main" val="1634513673"/>
       </p:ext>
     </p:extLst>
   </p:cSld>
@@ -13841,7 +14458,7 @@
                 <a:cs typeface="Calibri"/>
                 <a:sym typeface="Calibri"/>
               </a:rPr>
-              <a:t>An aside – Pulse Width Modulation</a:t>
+              <a:t>An aside – Capacitors vs Inductors</a:t>
             </a:r>
             <a:endParaRPr lang="en" dirty="0">
               <a:latin typeface="Calibri"/>
@@ -13864,8 +14481,8 @@
         </p:nvSpPr>
         <p:spPr>
           <a:xfrm>
-            <a:off x="311700" y="1262329"/>
-            <a:ext cx="3726226" cy="2492347"/>
+            <a:off x="311700" y="1108516"/>
+            <a:ext cx="3693858" cy="2492347"/>
           </a:xfrm>
           <a:prstGeom prst="rect">
             <a:avLst/>
@@ -13888,59 +14505,6 @@
               <a:buFont typeface="Arial"/>
               <a:buNone/>
             </a:pPr>
-            <a:r>
-              <a:rPr lang="en" dirty="0" smtClean="0">
-                <a:latin typeface="Calibri"/>
-                <a:ea typeface="Calibri"/>
-                <a:cs typeface="Calibri"/>
-                <a:sym typeface="Calibri"/>
-              </a:rPr>
-              <a:t>PWM is toggling a switch on and off at varying duty cycle</a:t>
-            </a:r>
-          </a:p>
-          <a:p>
-            <a:pPr lvl="0">
-              <a:spcBef>
-                <a:spcPts val="0"/>
-              </a:spcBef>
-              <a:buClr>
-                <a:schemeClr val="dk1"/>
-              </a:buClr>
-              <a:buSzPts val="1100"/>
-              <a:buFont typeface="Arial"/>
-              <a:buNone/>
-            </a:pPr>
-            <a:r>
-              <a:rPr lang="en" dirty="0" smtClean="0">
-                <a:latin typeface="Calibri"/>
-                <a:ea typeface="Calibri"/>
-                <a:cs typeface="Calibri"/>
-                <a:sym typeface="Calibri"/>
-              </a:rPr>
-              <a:t>Duty cycle is expressed in percent on time</a:t>
-            </a:r>
-          </a:p>
-          <a:p>
-            <a:pPr lvl="0">
-              <a:spcBef>
-                <a:spcPts val="0"/>
-              </a:spcBef>
-              <a:buClr>
-                <a:schemeClr val="dk1"/>
-              </a:buClr>
-              <a:buSzPts val="1100"/>
-              <a:buFont typeface="Arial"/>
-              <a:buNone/>
-            </a:pPr>
-            <a:r>
-              <a:rPr lang="en" dirty="0" smtClean="0">
-                <a:latin typeface="Calibri"/>
-                <a:ea typeface="Calibri"/>
-                <a:cs typeface="Calibri"/>
-                <a:sym typeface="Calibri"/>
-              </a:rPr>
-              <a:t>Indepe</a:t>
-            </a:r>
             <a:r>
               <a:rPr lang="en-US" dirty="0" smtClean="0">
                 <a:latin typeface="Calibri"/>
@@ -13948,16 +14512,51 @@
                 <a:cs typeface="Calibri"/>
                 <a:sym typeface="Calibri"/>
               </a:rPr>
-              <a:t>n</a:t>
+              <a:t>Capacitor</a:t>
             </a:r>
+          </a:p>
+          <a:p>
+            <a:pPr lvl="0">
+              <a:spcBef>
+                <a:spcPts val="0"/>
+              </a:spcBef>
+              <a:buClr>
+                <a:schemeClr val="dk1"/>
+              </a:buClr>
+              <a:buSzPts val="1100"/>
+              <a:buFont typeface="Arial"/>
+              <a:buNone/>
+            </a:pPr>
             <a:r>
-              <a:rPr lang="en" dirty="0" smtClean="0">
+              <a:rPr lang="en-US" dirty="0" smtClean="0">
                 <a:latin typeface="Calibri"/>
                 <a:ea typeface="Calibri"/>
                 <a:cs typeface="Calibri"/>
                 <a:sym typeface="Calibri"/>
               </a:rPr>
-              <a:t>dent of base frequency!</a:t>
+              <a:t>Stores charge in parallel plates Resists changes in voltage</a:t>
+            </a:r>
+          </a:p>
+          <a:p>
+            <a:pPr lvl="0">
+              <a:spcBef>
+                <a:spcPts val="0"/>
+              </a:spcBef>
+              <a:buClr>
+                <a:schemeClr val="dk1"/>
+              </a:buClr>
+              <a:buSzPts val="1100"/>
+              <a:buFont typeface="Arial"/>
+              <a:buNone/>
+            </a:pPr>
+            <a:r>
+              <a:rPr lang="en-US" dirty="0" smtClean="0">
+                <a:latin typeface="Calibri"/>
+                <a:ea typeface="Calibri"/>
+                <a:cs typeface="Calibri"/>
+                <a:sym typeface="Calibri"/>
+              </a:rPr>
+              <a:t>Measured in Farads – 1 Farad = 1 coulomb at 1 volt</a:t>
             </a:r>
             <a:endParaRPr lang="en" dirty="0" smtClean="0">
               <a:latin typeface="Calibri"/>
@@ -14094,7 +14693,7 @@
       </p:sp>
       <p:pic>
         <p:nvPicPr>
-          <p:cNvPr id="3" name="Picture 2"/>
+          <p:cNvPr id="2" name="Picture 1"/>
           <p:cNvPicPr>
             <a:picLocks noChangeAspect="1"/>
           </p:cNvPicPr>
@@ -14114,8 +14713,8 @@
         </p:blipFill>
         <p:spPr>
           <a:xfrm>
-            <a:off x="4255748" y="791181"/>
-            <a:ext cx="4576552" cy="3434644"/>
+            <a:off x="4202800" y="954705"/>
+            <a:ext cx="4479954" cy="2799971"/>
           </a:xfrm>
           <a:prstGeom prst="rect">
             <a:avLst/>
@@ -14125,7 +14724,7 @@
     </p:spTree>
     <p:extLst>
       <p:ext uri="{BB962C8B-B14F-4D97-AF65-F5344CB8AC3E}">
-        <p14:creationId xmlns:p14="http://schemas.microsoft.com/office/powerpoint/2010/main" val="1634513673"/>
+        <p14:creationId xmlns:p14="http://schemas.microsoft.com/office/powerpoint/2010/main" val="1345142895"/>
       </p:ext>
     </p:extLst>
   </p:cSld>

</xml_diff>